<commit_message>
Updated questions after walking through.
</commit_message>
<xml_diff>
--- a/Lessons/Lesson_VI/Lesson_VI_Questions.pptx
+++ b/Lessons/Lesson_VI/Lesson_VI_Questions.pptx
@@ -9,6 +9,15 @@
     <p:sldId id="257" r:id="rId4"/>
     <p:sldId id="258" r:id="rId5"/>
     <p:sldId id="259" r:id="rId6"/>
+    <p:sldId id="260" r:id="rId7"/>
+    <p:sldId id="261" r:id="rId8"/>
+    <p:sldId id="262" r:id="rId9"/>
+    <p:sldId id="263" r:id="rId10"/>
+    <p:sldId id="264" r:id="rId11"/>
+    <p:sldId id="265" r:id="rId12"/>
+    <p:sldId id="266" r:id="rId13"/>
+    <p:sldId id="267" r:id="rId14"/>
+    <p:sldId id="268" r:id="rId15"/>
   </p:sldIdLst>
   <p:sldSz cx="10080625" cy="7559675"/>
   <p:notesSz cx="7559675" cy="10691812"/>
@@ -56,7 +65,7 @@
       </p:grpSpPr>
       <p:sp>
         <p:nvSpPr>
-          <p:cNvPr id="26" name="PlaceHolder 1"/>
+          <p:cNvPr id="24" name="PlaceHolder 1"/>
           <p:cNvSpPr>
             <a:spLocks noGrp="1"/>
           </p:cNvSpPr>
@@ -67,7 +76,7 @@
         <p:spPr>
           <a:xfrm>
             <a:off x="504000" y="301320"/>
-            <a:ext cx="9071640" cy="1262160"/>
+            <a:ext cx="9071280" cy="1261800"/>
           </a:xfrm>
           <a:prstGeom prst="rect">
             <a:avLst/>
@@ -83,7 +92,7 @@
       </p:sp>
       <p:sp>
         <p:nvSpPr>
-          <p:cNvPr id="27" name="PlaceHolder 2"/>
+          <p:cNvPr id="25" name="PlaceHolder 2"/>
           <p:cNvSpPr>
             <a:spLocks noGrp="1"/>
           </p:cNvSpPr>
@@ -94,7 +103,7 @@
         <p:spPr>
           <a:xfrm>
             <a:off x="504000" y="1769040"/>
-            <a:ext cx="9071640" cy="2091240"/>
+            <a:ext cx="9071280" cy="2090880"/>
           </a:xfrm>
           <a:prstGeom prst="rect">
             <a:avLst/>
@@ -109,7 +118,7 @@
       </p:sp>
       <p:sp>
         <p:nvSpPr>
-          <p:cNvPr id="28" name="PlaceHolder 3"/>
+          <p:cNvPr id="26" name="PlaceHolder 3"/>
           <p:cNvSpPr>
             <a:spLocks noGrp="1"/>
           </p:cNvSpPr>
@@ -119,8 +128,8 @@
         </p:nvSpPr>
         <p:spPr>
           <a:xfrm>
-            <a:off x="504000" y="4059360"/>
-            <a:ext cx="9071640" cy="2091240"/>
+            <a:off x="504000" y="4059000"/>
+            <a:ext cx="9071280" cy="2090880"/>
           </a:xfrm>
           <a:prstGeom prst="rect">
             <a:avLst/>
@@ -157,7 +166,7 @@
       </p:grpSpPr>
       <p:sp>
         <p:nvSpPr>
-          <p:cNvPr id="29" name="PlaceHolder 1"/>
+          <p:cNvPr id="27" name="PlaceHolder 1"/>
           <p:cNvSpPr>
             <a:spLocks noGrp="1"/>
           </p:cNvSpPr>
@@ -168,7 +177,7 @@
         <p:spPr>
           <a:xfrm>
             <a:off x="504000" y="301320"/>
-            <a:ext cx="9071640" cy="1262160"/>
+            <a:ext cx="9071280" cy="1261800"/>
           </a:xfrm>
           <a:prstGeom prst="rect">
             <a:avLst/>
@@ -184,7 +193,7 @@
       </p:sp>
       <p:sp>
         <p:nvSpPr>
-          <p:cNvPr id="30" name="PlaceHolder 2"/>
+          <p:cNvPr id="28" name="PlaceHolder 2"/>
           <p:cNvSpPr>
             <a:spLocks noGrp="1"/>
           </p:cNvSpPr>
@@ -195,7 +204,7 @@
         <p:spPr>
           <a:xfrm>
             <a:off x="504000" y="1769040"/>
-            <a:ext cx="4426920" cy="2091240"/>
+            <a:ext cx="4426560" cy="2090880"/>
           </a:xfrm>
           <a:prstGeom prst="rect">
             <a:avLst/>
@@ -210,7 +219,7 @@
       </p:sp>
       <p:sp>
         <p:nvSpPr>
-          <p:cNvPr id="31" name="PlaceHolder 3"/>
+          <p:cNvPr id="29" name="PlaceHolder 3"/>
           <p:cNvSpPr>
             <a:spLocks noGrp="1"/>
           </p:cNvSpPr>
@@ -220,8 +229,8 @@
         </p:nvSpPr>
         <p:spPr>
           <a:xfrm>
-            <a:off x="5152680" y="1769040"/>
-            <a:ext cx="4426920" cy="2091240"/>
+            <a:off x="5152320" y="1769040"/>
+            <a:ext cx="4426560" cy="2090880"/>
           </a:xfrm>
           <a:prstGeom prst="rect">
             <a:avLst/>
@@ -236,7 +245,7 @@
       </p:sp>
       <p:sp>
         <p:nvSpPr>
-          <p:cNvPr id="32" name="PlaceHolder 4"/>
+          <p:cNvPr id="30" name="PlaceHolder 4"/>
           <p:cNvSpPr>
             <a:spLocks noGrp="1"/>
           </p:cNvSpPr>
@@ -246,8 +255,8 @@
         </p:nvSpPr>
         <p:spPr>
           <a:xfrm>
-            <a:off x="5152680" y="4059360"/>
-            <a:ext cx="4426920" cy="2091240"/>
+            <a:off x="5152320" y="4059000"/>
+            <a:ext cx="4426560" cy="2090880"/>
           </a:xfrm>
           <a:prstGeom prst="rect">
             <a:avLst/>
@@ -262,7 +271,7 @@
       </p:sp>
       <p:sp>
         <p:nvSpPr>
-          <p:cNvPr id="33" name="PlaceHolder 5"/>
+          <p:cNvPr id="31" name="PlaceHolder 5"/>
           <p:cNvSpPr>
             <a:spLocks noGrp="1"/>
           </p:cNvSpPr>
@@ -272,8 +281,8 @@
         </p:nvSpPr>
         <p:spPr>
           <a:xfrm>
-            <a:off x="504000" y="4059360"/>
-            <a:ext cx="4426920" cy="2091240"/>
+            <a:off x="504000" y="4059000"/>
+            <a:ext cx="4426560" cy="2090880"/>
           </a:xfrm>
           <a:prstGeom prst="rect">
             <a:avLst/>
@@ -310,7 +319,7 @@
       </p:grpSpPr>
       <p:sp>
         <p:nvSpPr>
-          <p:cNvPr id="34" name="PlaceHolder 1"/>
+          <p:cNvPr id="32" name="PlaceHolder 1"/>
           <p:cNvSpPr>
             <a:spLocks noGrp="1"/>
           </p:cNvSpPr>
@@ -321,7 +330,7 @@
         <p:spPr>
           <a:xfrm>
             <a:off x="504000" y="301320"/>
-            <a:ext cx="9071640" cy="1262160"/>
+            <a:ext cx="9071280" cy="1261800"/>
           </a:xfrm>
           <a:prstGeom prst="rect">
             <a:avLst/>
@@ -337,7 +346,7 @@
       </p:sp>
       <p:sp>
         <p:nvSpPr>
-          <p:cNvPr id="35" name="PlaceHolder 2"/>
+          <p:cNvPr id="33" name="PlaceHolder 2"/>
           <p:cNvSpPr>
             <a:spLocks noGrp="1"/>
           </p:cNvSpPr>
@@ -348,7 +357,7 @@
         <p:spPr>
           <a:xfrm>
             <a:off x="504000" y="1769040"/>
-            <a:ext cx="9071640" cy="4384440"/>
+            <a:ext cx="9071280" cy="4384080"/>
           </a:xfrm>
           <a:prstGeom prst="rect">
             <a:avLst/>
@@ -363,7 +372,7 @@
       </p:sp>
       <p:sp>
         <p:nvSpPr>
-          <p:cNvPr id="36" name="PlaceHolder 3"/>
+          <p:cNvPr id="34" name="PlaceHolder 3"/>
           <p:cNvSpPr>
             <a:spLocks noGrp="1"/>
           </p:cNvSpPr>
@@ -374,7 +383,7 @@
         <p:spPr>
           <a:xfrm>
             <a:off x="504000" y="1769040"/>
-            <a:ext cx="9071640" cy="4384440"/>
+            <a:ext cx="9071280" cy="4384080"/>
           </a:xfrm>
           <a:prstGeom prst="rect">
             <a:avLst/>
@@ -389,7 +398,7 @@
       </p:sp>
       <p:pic>
         <p:nvPicPr>
-          <p:cNvPr id="37" name="" descr=""/>
+          <p:cNvPr id="35" name="" descr=""/>
           <p:cNvPicPr/>
           <p:nvPr/>
         </p:nvPicPr>
@@ -399,8 +408,8 @@
         </p:blipFill>
         <p:spPr>
           <a:xfrm>
-            <a:off x="2291760" y="1768680"/>
-            <a:ext cx="5495400" cy="4384440"/>
+            <a:off x="2292120" y="1769040"/>
+            <a:ext cx="5494680" cy="4384080"/>
           </a:xfrm>
           <a:prstGeom prst="rect">
             <a:avLst/>
@@ -412,7 +421,7 @@
       </p:pic>
       <p:pic>
         <p:nvPicPr>
-          <p:cNvPr id="38" name="" descr=""/>
+          <p:cNvPr id="36" name="" descr=""/>
           <p:cNvPicPr/>
           <p:nvPr/>
         </p:nvPicPr>
@@ -422,8 +431,8 @@
         </p:blipFill>
         <p:spPr>
           <a:xfrm>
-            <a:off x="2291760" y="1768680"/>
-            <a:ext cx="5495400" cy="4384440"/>
+            <a:off x="2292120" y="1769040"/>
+            <a:ext cx="5494680" cy="4384080"/>
           </a:xfrm>
           <a:prstGeom prst="rect">
             <a:avLst/>
@@ -457,7 +466,7 @@
       </p:grpSpPr>
       <p:sp>
         <p:nvSpPr>
-          <p:cNvPr id="5" name="PlaceHolder 1"/>
+          <p:cNvPr id="3" name="PlaceHolder 1"/>
           <p:cNvSpPr>
             <a:spLocks noGrp="1"/>
           </p:cNvSpPr>
@@ -468,7 +477,7 @@
         <p:spPr>
           <a:xfrm>
             <a:off x="504000" y="301320"/>
-            <a:ext cx="9071640" cy="1262160"/>
+            <a:ext cx="9071280" cy="1261800"/>
           </a:xfrm>
           <a:prstGeom prst="rect">
             <a:avLst/>
@@ -484,7 +493,7 @@
       </p:sp>
       <p:sp>
         <p:nvSpPr>
-          <p:cNvPr id="6" name="PlaceHolder 2"/>
+          <p:cNvPr id="4" name="PlaceHolder 2"/>
           <p:cNvSpPr>
             <a:spLocks noGrp="1"/>
           </p:cNvSpPr>
@@ -495,7 +504,7 @@
         <p:spPr>
           <a:xfrm>
             <a:off x="504000" y="1769040"/>
-            <a:ext cx="9071640" cy="4384440"/>
+            <a:ext cx="9071280" cy="4384080"/>
           </a:xfrm>
           <a:prstGeom prst="rect">
             <a:avLst/>
@@ -533,7 +542,7 @@
       </p:grpSpPr>
       <p:sp>
         <p:nvSpPr>
-          <p:cNvPr id="7" name="PlaceHolder 1"/>
+          <p:cNvPr id="5" name="PlaceHolder 1"/>
           <p:cNvSpPr>
             <a:spLocks noGrp="1"/>
           </p:cNvSpPr>
@@ -544,7 +553,7 @@
         <p:spPr>
           <a:xfrm>
             <a:off x="504000" y="301320"/>
-            <a:ext cx="9071640" cy="1262160"/>
+            <a:ext cx="9071280" cy="1261800"/>
           </a:xfrm>
           <a:prstGeom prst="rect">
             <a:avLst/>
@@ -560,7 +569,7 @@
       </p:sp>
       <p:sp>
         <p:nvSpPr>
-          <p:cNvPr id="8" name="PlaceHolder 2"/>
+          <p:cNvPr id="6" name="PlaceHolder 2"/>
           <p:cNvSpPr>
             <a:spLocks noGrp="1"/>
           </p:cNvSpPr>
@@ -571,7 +580,7 @@
         <p:spPr>
           <a:xfrm>
             <a:off x="504000" y="1769040"/>
-            <a:ext cx="9071640" cy="4384440"/>
+            <a:ext cx="9071280" cy="4384080"/>
           </a:xfrm>
           <a:prstGeom prst="rect">
             <a:avLst/>
@@ -608,7 +617,7 @@
       </p:grpSpPr>
       <p:sp>
         <p:nvSpPr>
-          <p:cNvPr id="9" name="PlaceHolder 1"/>
+          <p:cNvPr id="7" name="PlaceHolder 1"/>
           <p:cNvSpPr>
             <a:spLocks noGrp="1"/>
           </p:cNvSpPr>
@@ -619,7 +628,7 @@
         <p:spPr>
           <a:xfrm>
             <a:off x="504000" y="301320"/>
-            <a:ext cx="9071640" cy="1262160"/>
+            <a:ext cx="9071280" cy="1261800"/>
           </a:xfrm>
           <a:prstGeom prst="rect">
             <a:avLst/>
@@ -635,7 +644,7 @@
       </p:sp>
       <p:sp>
         <p:nvSpPr>
-          <p:cNvPr id="10" name="PlaceHolder 2"/>
+          <p:cNvPr id="8" name="PlaceHolder 2"/>
           <p:cNvSpPr>
             <a:spLocks noGrp="1"/>
           </p:cNvSpPr>
@@ -646,7 +655,7 @@
         <p:spPr>
           <a:xfrm>
             <a:off x="504000" y="1769040"/>
-            <a:ext cx="4426920" cy="4384440"/>
+            <a:ext cx="4426560" cy="4384080"/>
           </a:xfrm>
           <a:prstGeom prst="rect">
             <a:avLst/>
@@ -661,7 +670,7 @@
       </p:sp>
       <p:sp>
         <p:nvSpPr>
-          <p:cNvPr id="11" name="PlaceHolder 3"/>
+          <p:cNvPr id="9" name="PlaceHolder 3"/>
           <p:cNvSpPr>
             <a:spLocks noGrp="1"/>
           </p:cNvSpPr>
@@ -671,8 +680,8 @@
         </p:nvSpPr>
         <p:spPr>
           <a:xfrm>
-            <a:off x="5152680" y="1769040"/>
-            <a:ext cx="4426920" cy="4384440"/>
+            <a:off x="5152320" y="1769040"/>
+            <a:ext cx="4426560" cy="4384080"/>
           </a:xfrm>
           <a:prstGeom prst="rect">
             <a:avLst/>
@@ -709,7 +718,7 @@
       </p:grpSpPr>
       <p:sp>
         <p:nvSpPr>
-          <p:cNvPr id="12" name="PlaceHolder 1"/>
+          <p:cNvPr id="10" name="PlaceHolder 1"/>
           <p:cNvSpPr>
             <a:spLocks noGrp="1"/>
           </p:cNvSpPr>
@@ -720,7 +729,7 @@
         <p:spPr>
           <a:xfrm>
             <a:off x="504000" y="301320"/>
-            <a:ext cx="9071640" cy="1262160"/>
+            <a:ext cx="9071280" cy="1261800"/>
           </a:xfrm>
           <a:prstGeom prst="rect">
             <a:avLst/>
@@ -758,7 +767,7 @@
       </p:grpSpPr>
       <p:sp>
         <p:nvSpPr>
-          <p:cNvPr id="13" name="PlaceHolder 1"/>
+          <p:cNvPr id="11" name="PlaceHolder 1"/>
           <p:cNvSpPr>
             <a:spLocks noGrp="1"/>
           </p:cNvSpPr>
@@ -769,7 +778,7 @@
         <p:spPr>
           <a:xfrm>
             <a:off x="504000" y="301320"/>
-            <a:ext cx="9071640" cy="5851800"/>
+            <a:ext cx="9071280" cy="5850360"/>
           </a:xfrm>
           <a:prstGeom prst="rect">
             <a:avLst/>
@@ -807,7 +816,7 @@
       </p:grpSpPr>
       <p:sp>
         <p:nvSpPr>
-          <p:cNvPr id="14" name="PlaceHolder 1"/>
+          <p:cNvPr id="12" name="PlaceHolder 1"/>
           <p:cNvSpPr>
             <a:spLocks noGrp="1"/>
           </p:cNvSpPr>
@@ -818,7 +827,7 @@
         <p:spPr>
           <a:xfrm>
             <a:off x="504000" y="301320"/>
-            <a:ext cx="9071640" cy="1262160"/>
+            <a:ext cx="9071280" cy="1261800"/>
           </a:xfrm>
           <a:prstGeom prst="rect">
             <a:avLst/>
@@ -834,7 +843,7 @@
       </p:sp>
       <p:sp>
         <p:nvSpPr>
-          <p:cNvPr id="15" name="PlaceHolder 2"/>
+          <p:cNvPr id="13" name="PlaceHolder 2"/>
           <p:cNvSpPr>
             <a:spLocks noGrp="1"/>
           </p:cNvSpPr>
@@ -845,7 +854,7 @@
         <p:spPr>
           <a:xfrm>
             <a:off x="504000" y="1769040"/>
-            <a:ext cx="4426920" cy="2091240"/>
+            <a:ext cx="4426560" cy="2090880"/>
           </a:xfrm>
           <a:prstGeom prst="rect">
             <a:avLst/>
@@ -860,7 +869,7 @@
       </p:sp>
       <p:sp>
         <p:nvSpPr>
-          <p:cNvPr id="16" name="PlaceHolder 3"/>
+          <p:cNvPr id="14" name="PlaceHolder 3"/>
           <p:cNvSpPr>
             <a:spLocks noGrp="1"/>
           </p:cNvSpPr>
@@ -870,8 +879,8 @@
         </p:nvSpPr>
         <p:spPr>
           <a:xfrm>
-            <a:off x="504000" y="4059360"/>
-            <a:ext cx="4426920" cy="2091240"/>
+            <a:off x="504000" y="4059000"/>
+            <a:ext cx="4426560" cy="2090880"/>
           </a:xfrm>
           <a:prstGeom prst="rect">
             <a:avLst/>
@@ -886,7 +895,7 @@
       </p:sp>
       <p:sp>
         <p:nvSpPr>
-          <p:cNvPr id="17" name="PlaceHolder 4"/>
+          <p:cNvPr id="15" name="PlaceHolder 4"/>
           <p:cNvSpPr>
             <a:spLocks noGrp="1"/>
           </p:cNvSpPr>
@@ -896,8 +905,8 @@
         </p:nvSpPr>
         <p:spPr>
           <a:xfrm>
-            <a:off x="5152680" y="1769040"/>
-            <a:ext cx="4426920" cy="4384440"/>
+            <a:off x="5152320" y="1769040"/>
+            <a:ext cx="4426560" cy="4384080"/>
           </a:xfrm>
           <a:prstGeom prst="rect">
             <a:avLst/>
@@ -934,7 +943,7 @@
       </p:grpSpPr>
       <p:sp>
         <p:nvSpPr>
-          <p:cNvPr id="18" name="PlaceHolder 1"/>
+          <p:cNvPr id="16" name="PlaceHolder 1"/>
           <p:cNvSpPr>
             <a:spLocks noGrp="1"/>
           </p:cNvSpPr>
@@ -945,7 +954,7 @@
         <p:spPr>
           <a:xfrm>
             <a:off x="504000" y="301320"/>
-            <a:ext cx="9071640" cy="1262160"/>
+            <a:ext cx="9071280" cy="1261800"/>
           </a:xfrm>
           <a:prstGeom prst="rect">
             <a:avLst/>
@@ -961,7 +970,7 @@
       </p:sp>
       <p:sp>
         <p:nvSpPr>
-          <p:cNvPr id="19" name="PlaceHolder 2"/>
+          <p:cNvPr id="17" name="PlaceHolder 2"/>
           <p:cNvSpPr>
             <a:spLocks noGrp="1"/>
           </p:cNvSpPr>
@@ -972,7 +981,7 @@
         <p:spPr>
           <a:xfrm>
             <a:off x="504000" y="1769040"/>
-            <a:ext cx="4426920" cy="4384440"/>
+            <a:ext cx="4426560" cy="4384080"/>
           </a:xfrm>
           <a:prstGeom prst="rect">
             <a:avLst/>
@@ -987,7 +996,7 @@
       </p:sp>
       <p:sp>
         <p:nvSpPr>
-          <p:cNvPr id="20" name="PlaceHolder 3"/>
+          <p:cNvPr id="18" name="PlaceHolder 3"/>
           <p:cNvSpPr>
             <a:spLocks noGrp="1"/>
           </p:cNvSpPr>
@@ -997,8 +1006,8 @@
         </p:nvSpPr>
         <p:spPr>
           <a:xfrm>
-            <a:off x="5152680" y="1769040"/>
-            <a:ext cx="4426920" cy="2091240"/>
+            <a:off x="5152320" y="1769040"/>
+            <a:ext cx="4426560" cy="2090880"/>
           </a:xfrm>
           <a:prstGeom prst="rect">
             <a:avLst/>
@@ -1013,7 +1022,7 @@
       </p:sp>
       <p:sp>
         <p:nvSpPr>
-          <p:cNvPr id="21" name="PlaceHolder 4"/>
+          <p:cNvPr id="19" name="PlaceHolder 4"/>
           <p:cNvSpPr>
             <a:spLocks noGrp="1"/>
           </p:cNvSpPr>
@@ -1023,8 +1032,8 @@
         </p:nvSpPr>
         <p:spPr>
           <a:xfrm>
-            <a:off x="5152680" y="4059360"/>
-            <a:ext cx="4426920" cy="2091240"/>
+            <a:off x="5152320" y="4059000"/>
+            <a:ext cx="4426560" cy="2090880"/>
           </a:xfrm>
           <a:prstGeom prst="rect">
             <a:avLst/>
@@ -1061,7 +1070,7 @@
       </p:grpSpPr>
       <p:sp>
         <p:nvSpPr>
-          <p:cNvPr id="22" name="PlaceHolder 1"/>
+          <p:cNvPr id="20" name="PlaceHolder 1"/>
           <p:cNvSpPr>
             <a:spLocks noGrp="1"/>
           </p:cNvSpPr>
@@ -1072,7 +1081,7 @@
         <p:spPr>
           <a:xfrm>
             <a:off x="504000" y="301320"/>
-            <a:ext cx="9071640" cy="1262160"/>
+            <a:ext cx="9071280" cy="1261800"/>
           </a:xfrm>
           <a:prstGeom prst="rect">
             <a:avLst/>
@@ -1088,7 +1097,7 @@
       </p:sp>
       <p:sp>
         <p:nvSpPr>
-          <p:cNvPr id="23" name="PlaceHolder 2"/>
+          <p:cNvPr id="21" name="PlaceHolder 2"/>
           <p:cNvSpPr>
             <a:spLocks noGrp="1"/>
           </p:cNvSpPr>
@@ -1099,7 +1108,7 @@
         <p:spPr>
           <a:xfrm>
             <a:off x="504000" y="1769040"/>
-            <a:ext cx="4426920" cy="2091240"/>
+            <a:ext cx="4426560" cy="2090880"/>
           </a:xfrm>
           <a:prstGeom prst="rect">
             <a:avLst/>
@@ -1114,7 +1123,7 @@
       </p:sp>
       <p:sp>
         <p:nvSpPr>
-          <p:cNvPr id="24" name="PlaceHolder 3"/>
+          <p:cNvPr id="22" name="PlaceHolder 3"/>
           <p:cNvSpPr>
             <a:spLocks noGrp="1"/>
           </p:cNvSpPr>
@@ -1124,8 +1133,8 @@
         </p:nvSpPr>
         <p:spPr>
           <a:xfrm>
-            <a:off x="5152680" y="1769040"/>
-            <a:ext cx="4426920" cy="2091240"/>
+            <a:off x="5152320" y="1769040"/>
+            <a:ext cx="4426560" cy="2090880"/>
           </a:xfrm>
           <a:prstGeom prst="rect">
             <a:avLst/>
@@ -1140,7 +1149,7 @@
       </p:sp>
       <p:sp>
         <p:nvSpPr>
-          <p:cNvPr id="25" name="PlaceHolder 4"/>
+          <p:cNvPr id="23" name="PlaceHolder 4"/>
           <p:cNvSpPr>
             <a:spLocks noGrp="1"/>
           </p:cNvSpPr>
@@ -1150,8 +1159,8 @@
         </p:nvSpPr>
         <p:spPr>
           <a:xfrm>
-            <a:off x="504000" y="4059360"/>
-            <a:ext cx="9071640" cy="2091240"/>
+            <a:off x="504000" y="4059000"/>
+            <a:ext cx="9071280" cy="2090880"/>
           </a:xfrm>
           <a:prstGeom prst="rect">
             <a:avLst/>
@@ -1199,7 +1208,7 @@
         <p:spPr>
           <a:xfrm>
             <a:off x="504000" y="301320"/>
-            <a:ext cx="9071640" cy="1262160"/>
+            <a:ext cx="9071280" cy="1261800"/>
           </a:xfrm>
           <a:prstGeom prst="rect">
             <a:avLst/>
@@ -1209,12 +1218,6 @@
           <a:bodyPr lIns="0" rIns="0" tIns="0" bIns="0" anchor="ctr"/>
           <a:p>
             <a:pPr algn="ctr"/>
-            <a:r>
-              <a:rPr lang="en-AU" sz="4400">
-                <a:latin typeface="Arial"/>
-              </a:rPr>
-              <a:t>Click to edit the title text format</a:t>
-            </a:r>
             <a:endParaRPr/>
           </a:p>
         </p:txBody>
@@ -1222,6 +1225,33 @@
       <p:sp>
         <p:nvSpPr>
           <p:cNvPr id="1" name="PlaceHolder 2"/>
+          <p:cNvSpPr>
+            <a:spLocks noGrp="1"/>
+          </p:cNvSpPr>
+          <p:nvPr>
+            <p:ph type="subTitle"/>
+          </p:nvPr>
+        </p:nvSpPr>
+        <p:spPr>
+          <a:xfrm>
+            <a:off x="504000" y="1769040"/>
+            <a:ext cx="9071280" cy="4384080"/>
+          </a:xfrm>
+          <a:prstGeom prst="rect">
+            <a:avLst/>
+          </a:prstGeom>
+        </p:spPr>
+        <p:txBody>
+          <a:bodyPr lIns="0" rIns="0" tIns="0" bIns="0" anchor="ctr"/>
+          <a:p>
+            <a:pPr algn="ctr"/>
+            <a:endParaRPr/>
+          </a:p>
+        </p:txBody>
+      </p:sp>
+      <p:sp>
+        <p:nvSpPr>
+          <p:cNvPr id="2" name="PlaceHolder 3"/>
           <p:cNvSpPr>
             <a:spLocks noGrp="1"/>
           </p:cNvSpPr>
@@ -1231,8 +1261,8 @@
         </p:nvSpPr>
         <p:spPr>
           <a:xfrm>
-            <a:off x="504000" y="1769040"/>
-            <a:ext cx="9071640" cy="4384440"/>
+            <a:off x="504000" y="1768680"/>
+            <a:ext cx="9072000" cy="4384080"/>
           </a:xfrm>
           <a:prstGeom prst="rect">
             <a:avLst/>
@@ -1336,104 +1366,6 @@
               </a:rPr>
               <a:t>Seventh Outline Level</a:t>
             </a:r>
-            <a:endParaRPr/>
-          </a:p>
-        </p:txBody>
-      </p:sp>
-      <p:sp>
-        <p:nvSpPr>
-          <p:cNvPr id="2" name="PlaceHolder 3"/>
-          <p:cNvSpPr>
-            <a:spLocks noGrp="1"/>
-          </p:cNvSpPr>
-          <p:nvPr>
-            <p:ph type="dt"/>
-          </p:nvPr>
-        </p:nvSpPr>
-        <p:spPr>
-          <a:xfrm>
-            <a:off x="504000" y="6887160"/>
-            <a:ext cx="2348280" cy="521280"/>
-          </a:xfrm>
-          <a:prstGeom prst="rect">
-            <a:avLst/>
-          </a:prstGeom>
-        </p:spPr>
-        <p:txBody>
-          <a:bodyPr lIns="0" rIns="0" tIns="0" bIns="0"/>
-          <a:p>
-            <a:r>
-              <a:rPr lang="en-AU" sz="1400">
-                <a:latin typeface="Times New Roman"/>
-              </a:rPr>
-              <a:t>&lt;date/time&gt;</a:t>
-            </a:r>
-            <a:endParaRPr/>
-          </a:p>
-        </p:txBody>
-      </p:sp>
-      <p:sp>
-        <p:nvSpPr>
-          <p:cNvPr id="3" name="PlaceHolder 4"/>
-          <p:cNvSpPr>
-            <a:spLocks noGrp="1"/>
-          </p:cNvSpPr>
-          <p:nvPr>
-            <p:ph type="ftr"/>
-          </p:nvPr>
-        </p:nvSpPr>
-        <p:spPr>
-          <a:xfrm>
-            <a:off x="3447360" y="6887160"/>
-            <a:ext cx="3195000" cy="521280"/>
-          </a:xfrm>
-          <a:prstGeom prst="rect">
-            <a:avLst/>
-          </a:prstGeom>
-        </p:spPr>
-        <p:txBody>
-          <a:bodyPr lIns="0" rIns="0" tIns="0" bIns="0"/>
-          <a:p>
-            <a:pPr algn="ctr"/>
-            <a:r>
-              <a:rPr lang="en-AU" sz="1400">
-                <a:latin typeface="Times New Roman"/>
-              </a:rPr>
-              <a:t>&lt;footer&gt;</a:t>
-            </a:r>
-            <a:endParaRPr/>
-          </a:p>
-        </p:txBody>
-      </p:sp>
-      <p:sp>
-        <p:nvSpPr>
-          <p:cNvPr id="4" name="PlaceHolder 5"/>
-          <p:cNvSpPr>
-            <a:spLocks noGrp="1"/>
-          </p:cNvSpPr>
-          <p:nvPr>
-            <p:ph type="sldNum"/>
-          </p:nvPr>
-        </p:nvSpPr>
-        <p:spPr>
-          <a:xfrm>
-            <a:off x="7227360" y="6887160"/>
-            <a:ext cx="2348280" cy="521280"/>
-          </a:xfrm>
-          <a:prstGeom prst="rect">
-            <a:avLst/>
-          </a:prstGeom>
-        </p:spPr>
-        <p:txBody>
-          <a:bodyPr lIns="0" rIns="0" tIns="0" bIns="0"/>
-          <a:p>
-            <a:pPr algn="r"/>
-            <a:fld id="{A90F56DD-0E98-4593-863E-56A9F74BE26F}" type="slidenum">
-              <a:rPr lang="en-AU" sz="1400">
-                <a:latin typeface="Times New Roman"/>
-              </a:rPr>
-              <a:t>&lt;number&gt;</a:t>
-            </a:fld>
             <a:endParaRPr/>
           </a:p>
         </p:txBody>
@@ -1477,14 +1409,14 @@
       </p:grpSpPr>
       <p:sp>
         <p:nvSpPr>
-          <p:cNvPr id="39" name="TextShape 1"/>
-          <p:cNvSpPr txBox="1"/>
+          <p:cNvPr id="37" name="CustomShape 1"/>
+          <p:cNvSpPr/>
           <p:nvPr/>
         </p:nvSpPr>
         <p:spPr>
           <a:xfrm>
             <a:off x="504000" y="301320"/>
-            <a:ext cx="9071640" cy="1262160"/>
+            <a:ext cx="9071280" cy="1261800"/>
           </a:xfrm>
           <a:prstGeom prst="rect">
             <a:avLst/>
@@ -1494,29 +1426,36 @@
             <a:noFill/>
           </a:ln>
         </p:spPr>
+        <p:style>
+          <a:lnRef idx="0"/>
+          <a:fillRef idx="0"/>
+          <a:effectRef idx="0"/>
+          <a:fontRef idx="minor"/>
+        </p:style>
         <p:txBody>
           <a:bodyPr lIns="0" rIns="0" tIns="0" bIns="0" anchor="ctr"/>
           <a:p>
-            <a:r>
-              <a:rPr b="1" lang="en-AU" sz="4400">
-                <a:latin typeface="Arial"/>
-              </a:rPr>
-              <a:t>Question 1</a:t>
-            </a:r>
-            <a:endParaRPr/>
-          </a:p>
-        </p:txBody>
-      </p:sp>
-      <p:sp>
-        <p:nvSpPr>
-          <p:cNvPr id="40" name="TextShape 2"/>
-          <p:cNvSpPr txBox="1"/>
+            <a:pPr algn="ctr"/>
+            <a:r>
+              <a:rPr b="1" lang="en-AU" sz="4400" strike="noStrike">
+                <a:latin typeface="Arial"/>
+              </a:rPr>
+              <a:t>Exercise 1</a:t>
+            </a:r>
+            <a:endParaRPr/>
+          </a:p>
+        </p:txBody>
+      </p:sp>
+      <p:sp>
+        <p:nvSpPr>
+          <p:cNvPr id="38" name="CustomShape 2"/>
+          <p:cNvSpPr/>
           <p:nvPr/>
         </p:nvSpPr>
         <p:spPr>
           <a:xfrm>
             <a:off x="504000" y="1755360"/>
-            <a:ext cx="9071640" cy="4412160"/>
+            <a:ext cx="9071280" cy="4411800"/>
           </a:xfrm>
           <a:prstGeom prst="rect">
             <a:avLst/>
@@ -1526,126 +1465,40 @@
             <a:noFill/>
           </a:ln>
         </p:spPr>
+        <p:style>
+          <a:lnRef idx="0"/>
+          <a:fillRef idx="0"/>
+          <a:effectRef idx="0"/>
+          <a:fontRef idx="minor"/>
+        </p:style>
         <p:txBody>
           <a:bodyPr lIns="0" rIns="0" tIns="0" bIns="0" anchor="ctr"/>
           <a:p>
-            <a:r>
-              <a:rPr lang="en-AU" sz="3600">
-                <a:latin typeface="Arial"/>
-              </a:rPr>
-              <a:t>Why does Ben think snapshots are broken?</a:t>
-            </a:r>
-            <a:endParaRPr/>
-          </a:p>
-          <a:p>
+            <a:pPr algn="ctr"/>
+            <a:r>
+              <a:rPr lang="en-AU" sz="3600" strike="noStrike">
+                <a:latin typeface="Arial"/>
+              </a:rPr>
+              <a:t>Can you make a snapshot of your running VM</a:t>
+            </a:r>
             <a:endParaRPr/>
           </a:p>
           <a:p>
             <a:pPr>
-              <a:buFont typeface="StarSymbol"/>
-              <a:buAutoNum type="alphaUcParenR"/>
+              <a:lnSpc>
+                <a:spcPct val="100000"/>
+              </a:lnSpc>
             </a:pPr>
-            <a:r>
-              <a:rPr lang="en-AU" sz="3600">
-                <a:latin typeface="Arial"/>
-              </a:rPr>
-              <a:t> </a:t>
-            </a:r>
-            <a:r>
-              <a:rPr lang="en-AU" sz="3600">
-                <a:latin typeface="Arial"/>
-              </a:rPr>
-              <a:t>They are just too easy to do: suspicious!</a:t>
-            </a:r>
-            <a:endParaRPr/>
-          </a:p>
-          <a:p>
-            <a:pPr>
-              <a:buFont typeface="StarSymbol"/>
-              <a:buAutoNum type="alphaUcParenR"/>
+            <a:endParaRPr/>
+          </a:p>
+          <a:p>
+            <a:pPr algn="ctr">
+              <a:lnSpc>
+                <a:spcPct val="100000"/>
+              </a:lnSpc>
             </a:pPr>
             <a:r>
-              <a:rPr lang="en-AU" sz="3600">
-                <a:latin typeface="Arial"/>
-              </a:rPr>
-              <a:t> </a:t>
-            </a:r>
-            <a:r>
-              <a:rPr lang="en-AU" sz="3600">
-                <a:latin typeface="Arial"/>
-              </a:rPr>
-              <a:t>The magic nostrums aren't up to the task!</a:t>
-            </a:r>
-            <a:endParaRPr/>
-          </a:p>
-          <a:p>
-            <a:pPr>
-              <a:buFont typeface="StarSymbol"/>
-              <a:buAutoNum type="alphaUcParenR"/>
-            </a:pPr>
-            <a:r>
-              <a:rPr lang="en-AU" sz="3600">
-                <a:latin typeface="Arial"/>
-              </a:rPr>
-              <a:t> </a:t>
-            </a:r>
-            <a:r>
-              <a:rPr lang="en-AU" sz="3600">
-                <a:latin typeface="Arial"/>
-              </a:rPr>
-              <a:t>Ben likes a life more complicated</a:t>
-            </a:r>
-            <a:endParaRPr/>
-          </a:p>
-          <a:p>
-            <a:pPr>
-              <a:buFont typeface="StarSymbol"/>
-              <a:buAutoNum type="alphaUcParenR"/>
-            </a:pPr>
-            <a:r>
-              <a:rPr lang="en-AU" sz="3600">
-                <a:latin typeface="Arial"/>
-              </a:rPr>
-              <a:t> </a:t>
-            </a:r>
-            <a:r>
-              <a:rPr lang="en-AU" sz="3600">
-                <a:latin typeface="Arial"/>
-              </a:rPr>
-              <a:t>The state of the machine is not captured</a:t>
-            </a:r>
-            <a:endParaRPr/>
-          </a:p>
-          <a:p>
-            <a:pPr>
-              <a:buFont typeface="StarSymbol"/>
-              <a:buAutoNum type="alphaUcParenR"/>
-            </a:pPr>
-            <a:r>
-              <a:rPr lang="en-AU" sz="3600">
-                <a:latin typeface="Arial"/>
-              </a:rPr>
-              <a:t> </a:t>
-            </a:r>
-            <a:r>
-              <a:rPr lang="en-AU" sz="3600">
-                <a:latin typeface="Arial"/>
-              </a:rPr>
-              <a:t>Cosmic rays can flip their bits</a:t>
-            </a:r>
-            <a:endParaRPr/>
-          </a:p>
-          <a:p>
-            <a:pPr>
-              <a:buFont typeface="StarSymbol"/>
-              <a:buAutoNum type="alphaUcParenR"/>
-            </a:pPr>
-            <a:endParaRPr/>
-          </a:p>
-          <a:p>
-            <a:pPr algn="ctr"/>
-            <a:r>
-              <a:rPr lang="en-AU" sz="3200">
+              <a:rPr lang="en-AU" sz="3200" strike="noStrike">
                 <a:latin typeface="Arial"/>
               </a:rPr>
               <a:t>?</a:t>
@@ -1663,6 +1516,657 @@
           <p:childTnLst>
             <p:seq>
               <p:cTn id="2" nodeType="mainSeq"/>
+              <p:prevCondLst>
+                <p:cond delay="0" evt="onPrev">
+                  <p:tgtEl>
+                    <p:sldTgt/>
+                  </p:tgtEl>
+                </p:cond>
+              </p:prevCondLst>
+              <p:nextCondLst>
+                <p:cond delay="0" evt="onNext">
+                  <p:tgtEl>
+                    <p:sldTgt/>
+                  </p:tgtEl>
+                </p:cond>
+              </p:nextCondLst>
+            </p:seq>
+          </p:childTnLst>
+        </p:cTn>
+      </p:par>
+    </p:tnLst>
+  </p:timing>
+</p:sld>
+</file>
+
+<file path=ppt/slides/slide10.xml><?xml version="1.0" encoding="utf-8"?>
+<p:sld xmlns:a="http://schemas.openxmlformats.org/drawingml/2006/main" xmlns:p="http://schemas.openxmlformats.org/presentationml/2006/main" xmlns:r="http://schemas.openxmlformats.org/officeDocument/2006/relationships">
+  <p:cSld>
+    <p:spTree>
+      <p:nvGrpSpPr>
+        <p:cNvPr id="1" name=""/>
+        <p:cNvGrpSpPr/>
+        <p:nvPr/>
+      </p:nvGrpSpPr>
+      <p:grpSpPr>
+        <a:xfrm>
+          <a:off x="0" y="0"/>
+          <a:ext cx="0" cy="0"/>
+          <a:chOff x="0" y="0"/>
+          <a:chExt cx="0" cy="0"/>
+        </a:xfrm>
+      </p:grpSpPr>
+      <p:sp>
+        <p:nvSpPr>
+          <p:cNvPr id="55" name="CustomShape 1"/>
+          <p:cNvSpPr/>
+          <p:nvPr/>
+        </p:nvSpPr>
+        <p:spPr>
+          <a:xfrm>
+            <a:off x="504000" y="301320"/>
+            <a:ext cx="9071280" cy="1261800"/>
+          </a:xfrm>
+          <a:prstGeom prst="rect">
+            <a:avLst/>
+          </a:prstGeom>
+          <a:noFill/>
+          <a:ln>
+            <a:noFill/>
+          </a:ln>
+        </p:spPr>
+        <p:style>
+          <a:lnRef idx="0"/>
+          <a:fillRef idx="0"/>
+          <a:effectRef idx="0"/>
+          <a:fontRef idx="minor"/>
+        </p:style>
+        <p:txBody>
+          <a:bodyPr lIns="0" rIns="0" tIns="0" bIns="0" anchor="ctr"/>
+          <a:p>
+            <a:pPr algn="ctr"/>
+            <a:r>
+              <a:rPr b="1" lang="en-AU" sz="4400" strike="noStrike">
+                <a:latin typeface="Arial"/>
+              </a:rPr>
+              <a:t>Exercise 7</a:t>
+            </a:r>
+            <a:endParaRPr/>
+          </a:p>
+        </p:txBody>
+      </p:sp>
+      <p:sp>
+        <p:nvSpPr>
+          <p:cNvPr id="56" name="CustomShape 2"/>
+          <p:cNvSpPr/>
+          <p:nvPr/>
+        </p:nvSpPr>
+        <p:spPr>
+          <a:xfrm>
+            <a:off x="504000" y="1755360"/>
+            <a:ext cx="9071280" cy="4411800"/>
+          </a:xfrm>
+          <a:prstGeom prst="rect">
+            <a:avLst/>
+          </a:prstGeom>
+          <a:noFill/>
+          <a:ln>
+            <a:noFill/>
+          </a:ln>
+        </p:spPr>
+        <p:style>
+          <a:lnRef idx="0"/>
+          <a:fillRef idx="0"/>
+          <a:effectRef idx="0"/>
+          <a:fontRef idx="minor"/>
+        </p:style>
+        <p:txBody>
+          <a:bodyPr lIns="0" rIns="0" tIns="0" bIns="0" anchor="ctr"/>
+          <a:p>
+            <a:r>
+              <a:rPr lang="en-AU" sz="3600" strike="noStrike">
+                <a:solidFill>
+                  <a:srgbClr val="666666"/>
+                </a:solidFill>
+                <a:latin typeface="Andale Mono"/>
+              </a:rPr>
+              <a:t>df -h</a:t>
+            </a:r>
+            <a:endParaRPr/>
+          </a:p>
+          <a:p>
+            <a:r>
+              <a:rPr lang="en-AU" sz="3600" strike="noStrike">
+                <a:solidFill>
+                  <a:srgbClr val="666666"/>
+                </a:solidFill>
+                <a:latin typeface="Andale Mono"/>
+              </a:rPr>
+              <a:t>sudo chmod a+rw /mnt/ </a:t>
+            </a:r>
+            <a:endParaRPr/>
+          </a:p>
+          <a:p>
+            <a:r>
+              <a:rPr lang="en-AU" sz="3600" strike="noStrike">
+                <a:solidFill>
+                  <a:srgbClr val="666666"/>
+                </a:solidFill>
+                <a:latin typeface="Andale Mono"/>
+              </a:rPr>
+              <a:t>echo "File one" &gt; /mnt/file1.txt</a:t>
+            </a:r>
+            <a:endParaRPr/>
+          </a:p>
+          <a:p>
+            <a:r>
+              <a:rPr lang="en-AU" sz="3600" strike="noStrike">
+                <a:solidFill>
+                  <a:srgbClr val="666666"/>
+                </a:solidFill>
+                <a:latin typeface="Andale Mono"/>
+              </a:rPr>
+              <a:t>echo "File two" &gt; file2.txt</a:t>
+            </a:r>
+            <a:endParaRPr/>
+          </a:p>
+          <a:p>
+            <a:r>
+              <a:rPr lang="en-AU" sz="3600" strike="noStrike">
+                <a:solidFill>
+                  <a:srgbClr val="666666"/>
+                </a:solidFill>
+                <a:latin typeface="Andale Mono"/>
+              </a:rPr>
+              <a:t>more /mnt/file1.txt</a:t>
+            </a:r>
+            <a:endParaRPr/>
+          </a:p>
+          <a:p>
+            <a:r>
+              <a:rPr lang="en-AU" sz="3600" strike="noStrike">
+                <a:solidFill>
+                  <a:srgbClr val="666666"/>
+                </a:solidFill>
+                <a:latin typeface="Andale Mono"/>
+              </a:rPr>
+              <a:t>more file2.txt</a:t>
+            </a:r>
+            <a:endParaRPr/>
+          </a:p>
+          <a:p>
+            <a:pPr algn="ctr"/>
+            <a:endParaRPr/>
+          </a:p>
+          <a:p>
+            <a:pPr algn="ctr"/>
+            <a:r>
+              <a:rPr lang="en-AU" sz="3600" strike="noStrike">
+                <a:solidFill>
+                  <a:srgbClr val="000000"/>
+                </a:solidFill>
+                <a:latin typeface="Arial"/>
+              </a:rPr>
+              <a:t>Now terminate your VM, and launch a new one from your snapshot, this time using the largest flavor that you are allowed</a:t>
+            </a:r>
+            <a:endParaRPr/>
+          </a:p>
+        </p:txBody>
+      </p:sp>
+    </p:spTree>
+  </p:cSld>
+  <p:timing>
+    <p:tnLst>
+      <p:par>
+        <p:cTn id="19" dur="indefinite" restart="never" nodeType="tmRoot">
+          <p:childTnLst>
+            <p:seq>
+              <p:cTn id="20" nodeType="mainSeq"/>
+              <p:prevCondLst>
+                <p:cond delay="0" evt="onPrev">
+                  <p:tgtEl>
+                    <p:sldTgt/>
+                  </p:tgtEl>
+                </p:cond>
+              </p:prevCondLst>
+              <p:nextCondLst>
+                <p:cond delay="0" evt="onNext">
+                  <p:tgtEl>
+                    <p:sldTgt/>
+                  </p:tgtEl>
+                </p:cond>
+              </p:nextCondLst>
+            </p:seq>
+          </p:childTnLst>
+        </p:cTn>
+      </p:par>
+    </p:tnLst>
+  </p:timing>
+</p:sld>
+</file>
+
+<file path=ppt/slides/slide11.xml><?xml version="1.0" encoding="utf-8"?>
+<p:sld xmlns:a="http://schemas.openxmlformats.org/drawingml/2006/main" xmlns:p="http://schemas.openxmlformats.org/presentationml/2006/main" xmlns:r="http://schemas.openxmlformats.org/officeDocument/2006/relationships">
+  <p:cSld>
+    <p:spTree>
+      <p:nvGrpSpPr>
+        <p:cNvPr id="1" name=""/>
+        <p:cNvGrpSpPr/>
+        <p:nvPr/>
+      </p:nvGrpSpPr>
+      <p:grpSpPr>
+        <a:xfrm>
+          <a:off x="0" y="0"/>
+          <a:ext cx="0" cy="0"/>
+          <a:chOff x="0" y="0"/>
+          <a:chExt cx="0" cy="0"/>
+        </a:xfrm>
+      </p:grpSpPr>
+      <p:sp>
+        <p:nvSpPr>
+          <p:cNvPr id="57" name="CustomShape 1"/>
+          <p:cNvSpPr/>
+          <p:nvPr/>
+        </p:nvSpPr>
+        <p:spPr>
+          <a:xfrm>
+            <a:off x="504000" y="301320"/>
+            <a:ext cx="9071280" cy="1261800"/>
+          </a:xfrm>
+          <a:prstGeom prst="rect">
+            <a:avLst/>
+          </a:prstGeom>
+          <a:noFill/>
+          <a:ln>
+            <a:noFill/>
+          </a:ln>
+        </p:spPr>
+        <p:style>
+          <a:lnRef idx="0"/>
+          <a:fillRef idx="0"/>
+          <a:effectRef idx="0"/>
+          <a:fontRef idx="minor"/>
+        </p:style>
+        <p:txBody>
+          <a:bodyPr lIns="0" rIns="0" tIns="0" bIns="0" anchor="ctr"/>
+          <a:p>
+            <a:pPr algn="ctr"/>
+            <a:r>
+              <a:rPr b="1" lang="en-AU" sz="4400" strike="noStrike">
+                <a:latin typeface="Arial"/>
+              </a:rPr>
+              <a:t>Exercise 7, part 2</a:t>
+            </a:r>
+            <a:endParaRPr/>
+          </a:p>
+        </p:txBody>
+      </p:sp>
+      <p:sp>
+        <p:nvSpPr>
+          <p:cNvPr id="58" name="CustomShape 2"/>
+          <p:cNvSpPr/>
+          <p:nvPr/>
+        </p:nvSpPr>
+        <p:spPr>
+          <a:xfrm>
+            <a:off x="504000" y="1755360"/>
+            <a:ext cx="9071280" cy="4411800"/>
+          </a:xfrm>
+          <a:prstGeom prst="rect">
+            <a:avLst/>
+          </a:prstGeom>
+          <a:noFill/>
+          <a:ln>
+            <a:noFill/>
+          </a:ln>
+        </p:spPr>
+        <p:style>
+          <a:lnRef idx="0"/>
+          <a:fillRef idx="0"/>
+          <a:effectRef idx="0"/>
+          <a:fontRef idx="minor"/>
+        </p:style>
+        <p:txBody>
+          <a:bodyPr lIns="0" rIns="0" tIns="0" bIns="0" anchor="ctr"/>
+          <a:p>
+            <a:endParaRPr/>
+          </a:p>
+          <a:p>
+            <a:r>
+              <a:rPr lang="en-AU" sz="3600" strike="noStrike">
+                <a:solidFill>
+                  <a:srgbClr val="666666"/>
+                </a:solidFill>
+                <a:latin typeface="Andale Mono"/>
+              </a:rPr>
+              <a:t>sudo chmod a+rw /mnt/ </a:t>
+            </a:r>
+            <a:endParaRPr/>
+          </a:p>
+          <a:p>
+            <a:r>
+              <a:rPr lang="en-AU" sz="3600" strike="noStrike">
+                <a:solidFill>
+                  <a:srgbClr val="666666"/>
+                </a:solidFill>
+                <a:latin typeface="Andale Mono"/>
+              </a:rPr>
+              <a:t>more file2.txt</a:t>
+            </a:r>
+            <a:endParaRPr/>
+          </a:p>
+          <a:p>
+            <a:r>
+              <a:rPr lang="en-AU" sz="3600" strike="noStrike">
+                <a:solidFill>
+                  <a:srgbClr val="666666"/>
+                </a:solidFill>
+                <a:latin typeface="Andale Mono"/>
+              </a:rPr>
+              <a:t>more /mnt/file1.txt</a:t>
+            </a:r>
+            <a:endParaRPr/>
+          </a:p>
+          <a:p>
+            <a:endParaRPr/>
+          </a:p>
+          <a:p>
+            <a:pPr algn="ctr"/>
+            <a:r>
+              <a:rPr lang="en-AU" sz="3600" strike="noStrike">
+                <a:solidFill>
+                  <a:srgbClr val="000000"/>
+                </a:solidFill>
+                <a:latin typeface="Arial"/>
+              </a:rPr>
+              <a:t>Where's the missing file?</a:t>
+            </a:r>
+            <a:endParaRPr/>
+          </a:p>
+        </p:txBody>
+      </p:sp>
+    </p:spTree>
+  </p:cSld>
+  <p:timing>
+    <p:tnLst>
+      <p:par>
+        <p:cTn id="21" dur="indefinite" restart="never" nodeType="tmRoot">
+          <p:childTnLst>
+            <p:seq>
+              <p:cTn id="22" nodeType="mainSeq"/>
+              <p:prevCondLst>
+                <p:cond delay="0" evt="onPrev">
+                  <p:tgtEl>
+                    <p:sldTgt/>
+                  </p:tgtEl>
+                </p:cond>
+              </p:prevCondLst>
+              <p:nextCondLst>
+                <p:cond delay="0" evt="onNext">
+                  <p:tgtEl>
+                    <p:sldTgt/>
+                  </p:tgtEl>
+                </p:cond>
+              </p:nextCondLst>
+            </p:seq>
+          </p:childTnLst>
+        </p:cTn>
+      </p:par>
+    </p:tnLst>
+  </p:timing>
+</p:sld>
+</file>
+
+<file path=ppt/slides/slide12.xml><?xml version="1.0" encoding="utf-8"?>
+<p:sld xmlns:a="http://schemas.openxmlformats.org/drawingml/2006/main" xmlns:p="http://schemas.openxmlformats.org/presentationml/2006/main" xmlns:r="http://schemas.openxmlformats.org/officeDocument/2006/relationships">
+  <p:cSld>
+    <p:spTree>
+      <p:nvGrpSpPr>
+        <p:cNvPr id="1" name=""/>
+        <p:cNvGrpSpPr/>
+        <p:nvPr/>
+      </p:nvGrpSpPr>
+      <p:grpSpPr>
+        <a:xfrm>
+          <a:off x="0" y="0"/>
+          <a:ext cx="0" cy="0"/>
+          <a:chOff x="0" y="0"/>
+          <a:chExt cx="0" cy="0"/>
+        </a:xfrm>
+      </p:grpSpPr>
+      <p:sp>
+        <p:nvSpPr>
+          <p:cNvPr id="59" name="CustomShape 1"/>
+          <p:cNvSpPr/>
+          <p:nvPr/>
+        </p:nvSpPr>
+        <p:spPr>
+          <a:xfrm>
+            <a:off x="504000" y="301320"/>
+            <a:ext cx="9071280" cy="1261800"/>
+          </a:xfrm>
+          <a:prstGeom prst="rect">
+            <a:avLst/>
+          </a:prstGeom>
+          <a:noFill/>
+          <a:ln>
+            <a:noFill/>
+          </a:ln>
+        </p:spPr>
+        <p:style>
+          <a:lnRef idx="0"/>
+          <a:fillRef idx="0"/>
+          <a:effectRef idx="0"/>
+          <a:fontRef idx="minor"/>
+        </p:style>
+        <p:txBody>
+          <a:bodyPr lIns="0" rIns="0" tIns="0" bIns="0" anchor="ctr"/>
+          <a:p>
+            <a:pPr algn="ctr"/>
+            <a:r>
+              <a:rPr b="1" lang="en-AU" sz="4400" strike="noStrike">
+                <a:latin typeface="Arial"/>
+              </a:rPr>
+              <a:t>Exercise 8</a:t>
+            </a:r>
+            <a:endParaRPr/>
+          </a:p>
+        </p:txBody>
+      </p:sp>
+      <p:sp>
+        <p:nvSpPr>
+          <p:cNvPr id="60" name="CustomShape 2"/>
+          <p:cNvSpPr/>
+          <p:nvPr/>
+        </p:nvSpPr>
+        <p:spPr>
+          <a:xfrm>
+            <a:off x="504000" y="1755360"/>
+            <a:ext cx="9071280" cy="4411800"/>
+          </a:xfrm>
+          <a:prstGeom prst="rect">
+            <a:avLst/>
+          </a:prstGeom>
+          <a:noFill/>
+          <a:ln>
+            <a:noFill/>
+          </a:ln>
+        </p:spPr>
+        <p:style>
+          <a:lnRef idx="0"/>
+          <a:fillRef idx="0"/>
+          <a:effectRef idx="0"/>
+          <a:fontRef idx="minor"/>
+        </p:style>
+        <p:txBody>
+          <a:bodyPr lIns="0" rIns="0" tIns="0" bIns="0" anchor="ctr"/>
+          <a:p>
+            <a:pPr algn="ctr"/>
+            <a:r>
+              <a:rPr lang="en-AU" sz="3600" strike="noStrike">
+                <a:solidFill>
+                  <a:srgbClr val="000000"/>
+                </a:solidFill>
+                <a:latin typeface="Arial"/>
+              </a:rPr>
+              <a:t>Make your snapshot public by editing it:</a:t>
+            </a:r>
+            <a:endParaRPr/>
+          </a:p>
+          <a:p>
+            <a:pPr algn="ctr"/>
+            <a:r>
+              <a:rPr lang="en-AU" sz="3600" strike="noStrike">
+                <a:solidFill>
+                  <a:srgbClr val="000000"/>
+                </a:solidFill>
+                <a:latin typeface="Arial"/>
+              </a:rPr>
+              <a:t>And confirm that it appears in the list of public images!</a:t>
+            </a:r>
+            <a:endParaRPr/>
+          </a:p>
+        </p:txBody>
+      </p:sp>
+    </p:spTree>
+  </p:cSld>
+  <p:timing>
+    <p:tnLst>
+      <p:par>
+        <p:cTn id="23" dur="indefinite" restart="never" nodeType="tmRoot">
+          <p:childTnLst>
+            <p:seq>
+              <p:cTn id="24" nodeType="mainSeq"/>
+              <p:prevCondLst>
+                <p:cond delay="0" evt="onPrev">
+                  <p:tgtEl>
+                    <p:sldTgt/>
+                  </p:tgtEl>
+                </p:cond>
+              </p:prevCondLst>
+              <p:nextCondLst>
+                <p:cond delay="0" evt="onNext">
+                  <p:tgtEl>
+                    <p:sldTgt/>
+                  </p:tgtEl>
+                </p:cond>
+              </p:nextCondLst>
+            </p:seq>
+          </p:childTnLst>
+        </p:cTn>
+      </p:par>
+    </p:tnLst>
+  </p:timing>
+</p:sld>
+</file>
+
+<file path=ppt/slides/slide13.xml><?xml version="1.0" encoding="utf-8"?>
+<p:sld xmlns:a="http://schemas.openxmlformats.org/drawingml/2006/main" xmlns:p="http://schemas.openxmlformats.org/presentationml/2006/main" xmlns:r="http://schemas.openxmlformats.org/officeDocument/2006/relationships">
+  <p:cSld>
+    <p:spTree>
+      <p:nvGrpSpPr>
+        <p:cNvPr id="1" name=""/>
+        <p:cNvGrpSpPr/>
+        <p:nvPr/>
+      </p:nvGrpSpPr>
+      <p:grpSpPr>
+        <a:xfrm>
+          <a:off x="0" y="0"/>
+          <a:ext cx="0" cy="0"/>
+          <a:chOff x="0" y="0"/>
+          <a:chExt cx="0" cy="0"/>
+        </a:xfrm>
+      </p:grpSpPr>
+      <p:sp>
+        <p:nvSpPr>
+          <p:cNvPr id="61" name="CustomShape 1"/>
+          <p:cNvSpPr/>
+          <p:nvPr/>
+        </p:nvSpPr>
+        <p:spPr>
+          <a:xfrm>
+            <a:off x="504000" y="301320"/>
+            <a:ext cx="9071280" cy="1261800"/>
+          </a:xfrm>
+          <a:prstGeom prst="rect">
+            <a:avLst/>
+          </a:prstGeom>
+          <a:noFill/>
+          <a:ln>
+            <a:noFill/>
+          </a:ln>
+        </p:spPr>
+        <p:style>
+          <a:lnRef idx="0"/>
+          <a:fillRef idx="0"/>
+          <a:effectRef idx="0"/>
+          <a:fontRef idx="minor"/>
+        </p:style>
+        <p:txBody>
+          <a:bodyPr lIns="0" rIns="0" tIns="0" bIns="0" anchor="ctr"/>
+          <a:p>
+            <a:pPr algn="ctr"/>
+            <a:r>
+              <a:rPr b="1" lang="en-AU" sz="4400" strike="noStrike">
+                <a:latin typeface="Arial"/>
+              </a:rPr>
+              <a:t>Exercise 9</a:t>
+            </a:r>
+            <a:endParaRPr/>
+          </a:p>
+        </p:txBody>
+      </p:sp>
+      <p:sp>
+        <p:nvSpPr>
+          <p:cNvPr id="62" name="CustomShape 2"/>
+          <p:cNvSpPr/>
+          <p:nvPr/>
+        </p:nvSpPr>
+        <p:spPr>
+          <a:xfrm>
+            <a:off x="504000" y="1755360"/>
+            <a:ext cx="9071280" cy="4411800"/>
+          </a:xfrm>
+          <a:prstGeom prst="rect">
+            <a:avLst/>
+          </a:prstGeom>
+          <a:noFill/>
+          <a:ln>
+            <a:noFill/>
+          </a:ln>
+        </p:spPr>
+        <p:style>
+          <a:lnRef idx="0"/>
+          <a:fillRef idx="0"/>
+          <a:effectRef idx="0"/>
+          <a:fontRef idx="minor"/>
+        </p:style>
+        <p:txBody>
+          <a:bodyPr lIns="0" rIns="0" tIns="0" bIns="0" anchor="ctr"/>
+          <a:p>
+            <a:pPr algn="ctr"/>
+            <a:r>
+              <a:rPr lang="en-AU" sz="3600" strike="noStrike">
+                <a:solidFill>
+                  <a:srgbClr val="000000"/>
+                </a:solidFill>
+                <a:latin typeface="Arial"/>
+              </a:rPr>
+              <a:t>Delete your snapshot</a:t>
+            </a:r>
+            <a:endParaRPr/>
+          </a:p>
+        </p:txBody>
+      </p:sp>
+    </p:spTree>
+  </p:cSld>
+  <p:timing>
+    <p:tnLst>
+      <p:par>
+        <p:cTn id="25" dur="indefinite" restart="never" nodeType="tmRoot">
+          <p:childTnLst>
+            <p:seq>
+              <p:cTn id="26" nodeType="mainSeq"/>
               <p:prevCondLst>
                 <p:cond delay="0" evt="onPrev">
                   <p:tgtEl>
@@ -1705,14 +2209,14 @@
       </p:grpSpPr>
       <p:sp>
         <p:nvSpPr>
-          <p:cNvPr id="41" name="TextShape 1"/>
-          <p:cNvSpPr txBox="1"/>
+          <p:cNvPr id="39" name="CustomShape 1"/>
+          <p:cNvSpPr/>
           <p:nvPr/>
         </p:nvSpPr>
         <p:spPr>
           <a:xfrm>
             <a:off x="504000" y="301320"/>
-            <a:ext cx="9071640" cy="1262160"/>
+            <a:ext cx="9071280" cy="1261800"/>
           </a:xfrm>
           <a:prstGeom prst="rect">
             <a:avLst/>
@@ -1722,29 +2226,36 @@
             <a:noFill/>
           </a:ln>
         </p:spPr>
+        <p:style>
+          <a:lnRef idx="0"/>
+          <a:fillRef idx="0"/>
+          <a:effectRef idx="0"/>
+          <a:fontRef idx="minor"/>
+        </p:style>
         <p:txBody>
           <a:bodyPr lIns="0" rIns="0" tIns="0" bIns="0" anchor="ctr"/>
           <a:p>
-            <a:r>
-              <a:rPr b="1" lang="en-AU" sz="4400">
-                <a:latin typeface="Arial"/>
-              </a:rPr>
-              <a:t>Question 2</a:t>
-            </a:r>
-            <a:endParaRPr/>
-          </a:p>
-        </p:txBody>
-      </p:sp>
-      <p:sp>
-        <p:nvSpPr>
-          <p:cNvPr id="42" name="TextShape 2"/>
-          <p:cNvSpPr txBox="1"/>
+            <a:pPr algn="ctr"/>
+            <a:r>
+              <a:rPr b="1" lang="en-AU" sz="4400" strike="noStrike">
+                <a:latin typeface="Arial"/>
+              </a:rPr>
+              <a:t>Exercise 2</a:t>
+            </a:r>
+            <a:endParaRPr/>
+          </a:p>
+        </p:txBody>
+      </p:sp>
+      <p:sp>
+        <p:nvSpPr>
+          <p:cNvPr id="40" name="CustomShape 2"/>
+          <p:cNvSpPr/>
           <p:nvPr/>
         </p:nvSpPr>
         <p:spPr>
           <a:xfrm>
-            <a:off x="504000" y="934920"/>
-            <a:ext cx="9071640" cy="6052680"/>
+            <a:off x="504000" y="1755360"/>
+            <a:ext cx="9071280" cy="4411800"/>
           </a:xfrm>
           <a:prstGeom prst="rect">
             <a:avLst/>
@@ -1754,132 +2265,68 @@
             <a:noFill/>
           </a:ln>
         </p:spPr>
+        <p:style>
+          <a:lnRef idx="0"/>
+          <a:fillRef idx="0"/>
+          <a:effectRef idx="0"/>
+          <a:fontRef idx="minor"/>
+        </p:style>
         <p:txBody>
           <a:bodyPr lIns="0" rIns="0" tIns="0" bIns="0" anchor="ctr"/>
           <a:p>
-            <a:endParaRPr/>
-          </a:p>
-          <a:p>
-            <a:r>
-              <a:rPr lang="en-AU" sz="3600">
-                <a:latin typeface="Arial"/>
-              </a:rPr>
-              <a:t>What's a big problem with Anna's new approach?</a:t>
-            </a:r>
-            <a:endParaRPr/>
-          </a:p>
-          <a:p>
-            <a:endParaRPr/>
-          </a:p>
-          <a:p>
-            <a:pPr>
-              <a:buFont typeface="StarSymbol"/>
-              <a:buAutoNum type="alphaUcParenR"/>
+            <a:pPr algn="ctr"/>
+            <a:r>
+              <a:rPr lang="en-AU" sz="3600" strike="noStrike">
+                <a:solidFill>
+                  <a:srgbClr val="666666"/>
+                </a:solidFill>
+                <a:latin typeface="Andale Mono"/>
+              </a:rPr>
+              <a:t>./loop.sh</a:t>
+            </a:r>
+            <a:endParaRPr/>
+          </a:p>
+          <a:p>
+            <a:pPr algn="ctr">
+              <a:lnSpc>
+                <a:spcPct val="100000"/>
+              </a:lnSpc>
             </a:pPr>
-            <a:r>
-              <a:rPr lang="en-AU" sz="3200">
-                <a:latin typeface="Arial"/>
-              </a:rPr>
-              <a:t> </a:t>
-            </a:r>
-            <a:r>
-              <a:rPr lang="en-AU" sz="3200">
-                <a:latin typeface="Arial"/>
-              </a:rPr>
-              <a:t>You may forget to start your instance up again</a:t>
-            </a:r>
-            <a:endParaRPr/>
-          </a:p>
-          <a:p>
-            <a:pPr>
-              <a:buFont typeface="StarSymbol"/>
-              <a:buAutoNum type="alphaUcParenR"/>
+            <a:endParaRPr/>
+          </a:p>
+          <a:p>
+            <a:pPr algn="ctr">
+              <a:lnSpc>
+                <a:spcPct val="100000"/>
+              </a:lnSpc>
             </a:pPr>
             <a:r>
-              <a:rPr lang="en-AU" sz="3200">
-                <a:latin typeface="Arial"/>
-              </a:rPr>
-              <a:t> </a:t>
-            </a:r>
-            <a:r>
-              <a:rPr lang="en-AU" sz="3200">
-                <a:latin typeface="Arial"/>
-              </a:rPr>
-              <a:t>The powered off machine might not have saved its state properly</a:t>
-            </a:r>
-            <a:endParaRPr/>
-          </a:p>
-          <a:p>
-            <a:pPr>
-              <a:buFont typeface="StarSymbol"/>
-              <a:buAutoNum type="alphaUcParenR"/>
+              <a:rPr lang="en-AU" sz="3600" strike="noStrike">
+                <a:latin typeface="Arial"/>
+              </a:rPr>
+              <a:t>Then when done:</a:t>
+            </a:r>
+            <a:endParaRPr/>
+          </a:p>
+          <a:p>
+            <a:pPr algn="ctr">
+              <a:lnSpc>
+                <a:spcPct val="100000"/>
+              </a:lnSpc>
             </a:pPr>
-            <a:r>
-              <a:rPr lang="en-AU" sz="3200">
-                <a:latin typeface="Arial"/>
-              </a:rPr>
-              <a:t> </a:t>
-            </a:r>
-            <a:r>
-              <a:rPr lang="en-AU" sz="3200">
-                <a:latin typeface="Arial"/>
-              </a:rPr>
-              <a:t>The saved disk image is powerless</a:t>
-            </a:r>
-            <a:endParaRPr/>
-          </a:p>
-          <a:p>
-            <a:pPr>
-              <a:buFont typeface="StarSymbol"/>
-              <a:buAutoNum type="alphaUcParenR"/>
+            <a:endParaRPr/>
+          </a:p>
+          <a:p>
+            <a:pPr algn="ctr">
+              <a:lnSpc>
+                <a:spcPct val="100000"/>
+              </a:lnSpc>
             </a:pPr>
             <a:r>
-              <a:rPr lang="en-AU" sz="3200">
-                <a:latin typeface="Arial"/>
-              </a:rPr>
-              <a:t> </a:t>
-            </a:r>
-            <a:r>
-              <a:rPr lang="en-AU" sz="3200">
-                <a:latin typeface="Arial"/>
-              </a:rPr>
-              <a:t>The process overhead is too high</a:t>
-            </a:r>
-            <a:endParaRPr/>
-          </a:p>
-          <a:p>
-            <a:pPr>
-              <a:buFont typeface="StarSymbol"/>
-              <a:buAutoNum type="alphaUcParenR"/>
-            </a:pPr>
-            <a:r>
-              <a:rPr lang="en-AU" sz="3200">
-                <a:latin typeface="Arial"/>
-              </a:rPr>
-              <a:t>  </a:t>
-            </a:r>
-            <a:r>
-              <a:rPr lang="en-AU" sz="3200">
-                <a:latin typeface="Arial"/>
-              </a:rPr>
-              <a:t>How can you make a copy of a powered off disk?</a:t>
-            </a:r>
-            <a:endParaRPr/>
-          </a:p>
-          <a:p>
-            <a:pPr>
-              <a:buFont typeface="StarSymbol"/>
-              <a:buAutoNum type="alphaUcParenR"/>
-            </a:pPr>
-            <a:endParaRPr/>
-          </a:p>
-          <a:p>
-            <a:pPr algn="ctr"/>
-            <a:r>
-              <a:rPr lang="en-AU" sz="3200">
-                <a:latin typeface="Arial"/>
-              </a:rPr>
-              <a:t>?</a:t>
+              <a:rPr lang="en-AU" sz="3600" strike="noStrike">
+                <a:latin typeface="Arial"/>
+              </a:rPr>
+              <a:t>Ctrl key + C key</a:t>
             </a:r>
             <a:endParaRPr/>
           </a:p>
@@ -1936,14 +2383,14 @@
       </p:grpSpPr>
       <p:sp>
         <p:nvSpPr>
-          <p:cNvPr id="43" name="TextShape 1"/>
-          <p:cNvSpPr txBox="1"/>
+          <p:cNvPr id="41" name="CustomShape 1"/>
+          <p:cNvSpPr/>
           <p:nvPr/>
         </p:nvSpPr>
         <p:spPr>
           <a:xfrm>
             <a:off x="504000" y="301320"/>
-            <a:ext cx="9071640" cy="1262160"/>
+            <a:ext cx="9071280" cy="1261800"/>
           </a:xfrm>
           <a:prstGeom prst="rect">
             <a:avLst/>
@@ -1953,29 +2400,35 @@
             <a:noFill/>
           </a:ln>
         </p:spPr>
+        <p:style>
+          <a:lnRef idx="0"/>
+          <a:fillRef idx="0"/>
+          <a:effectRef idx="0"/>
+          <a:fontRef idx="minor"/>
+        </p:style>
         <p:txBody>
           <a:bodyPr lIns="0" rIns="0" tIns="0" bIns="0" anchor="ctr"/>
           <a:p>
             <a:r>
-              <a:rPr b="1" lang="en-AU" sz="4400">
-                <a:latin typeface="Arial"/>
-              </a:rPr>
-              <a:t>Question 3</a:t>
-            </a:r>
-            <a:endParaRPr/>
-          </a:p>
-        </p:txBody>
-      </p:sp>
-      <p:sp>
-        <p:nvSpPr>
-          <p:cNvPr id="44" name="TextShape 2"/>
-          <p:cNvSpPr txBox="1"/>
+              <a:rPr b="1" lang="en-AU" sz="4400" strike="noStrike">
+                <a:latin typeface="Arial"/>
+              </a:rPr>
+              <a:t>Question 1</a:t>
+            </a:r>
+            <a:endParaRPr/>
+          </a:p>
+        </p:txBody>
+      </p:sp>
+      <p:sp>
+        <p:nvSpPr>
+          <p:cNvPr id="42" name="CustomShape 2"/>
+          <p:cNvSpPr/>
           <p:nvPr/>
         </p:nvSpPr>
         <p:spPr>
           <a:xfrm>
-            <a:off x="504000" y="1698840"/>
-            <a:ext cx="9071640" cy="4525200"/>
+            <a:off x="504000" y="1755360"/>
+            <a:ext cx="9071280" cy="4411800"/>
           </a:xfrm>
           <a:prstGeom prst="rect">
             <a:avLst/>
@@ -1985,14 +2438,20 @@
             <a:noFill/>
           </a:ln>
         </p:spPr>
+        <p:style>
+          <a:lnRef idx="0"/>
+          <a:fillRef idx="0"/>
+          <a:effectRef idx="0"/>
+          <a:fontRef idx="minor"/>
+        </p:style>
         <p:txBody>
           <a:bodyPr lIns="0" rIns="0" tIns="0" bIns="0" anchor="ctr"/>
           <a:p>
             <a:r>
-              <a:rPr lang="en-AU" sz="3600">
-                <a:latin typeface="Arial"/>
-              </a:rPr>
-              <a:t>How can Anna fix her popularity problem?</a:t>
+              <a:rPr lang="en-AU" sz="3600" strike="noStrike">
+                <a:latin typeface="Arial"/>
+              </a:rPr>
+              <a:t>Why does Ben think snapshots are broken?</a:t>
             </a:r>
             <a:endParaRPr/>
           </a:p>
@@ -2001,110 +2460,130 @@
           </a:p>
           <a:p>
             <a:pPr>
+              <a:lnSpc>
+                <a:spcPct val="100000"/>
+              </a:lnSpc>
               <a:buFont typeface="StarSymbol"/>
               <a:buAutoNum type="alphaUcParenR"/>
             </a:pPr>
             <a:r>
-              <a:rPr lang="en-AU" sz="3600">
+              <a:rPr lang="en-AU" sz="3600" strike="noStrike">
                 <a:latin typeface="Arial"/>
               </a:rPr>
               <a:t> </a:t>
             </a:r>
             <a:r>
-              <a:rPr lang="en-AU" sz="3600">
-                <a:latin typeface="Arial"/>
-              </a:rPr>
-              <a:t>Nothing</a:t>
+              <a:rPr lang="en-AU" sz="3600" strike="noStrike">
+                <a:latin typeface="Arial"/>
+              </a:rPr>
+              <a:t>They are just too easy to do: suspicious!</a:t>
             </a:r>
             <a:endParaRPr/>
           </a:p>
           <a:p>
             <a:pPr>
+              <a:lnSpc>
+                <a:spcPct val="100000"/>
+              </a:lnSpc>
               <a:buFont typeface="StarSymbol"/>
               <a:buAutoNum type="alphaUcParenR"/>
             </a:pPr>
             <a:r>
-              <a:rPr lang="en-AU" sz="3600">
+              <a:rPr lang="en-AU" sz="3600" strike="noStrike">
                 <a:latin typeface="Arial"/>
               </a:rPr>
               <a:t> </a:t>
             </a:r>
             <a:r>
-              <a:rPr lang="en-AU" sz="3600">
-                <a:latin typeface="Arial"/>
-              </a:rPr>
-              <a:t>Upgrade to a more powerful machine</a:t>
+              <a:rPr lang="en-AU" sz="3600" strike="noStrike">
+                <a:latin typeface="Arial"/>
+              </a:rPr>
+              <a:t>The magic nostrums aren't up to the task!</a:t>
             </a:r>
             <a:endParaRPr/>
           </a:p>
           <a:p>
             <a:pPr>
+              <a:lnSpc>
+                <a:spcPct val="100000"/>
+              </a:lnSpc>
               <a:buFont typeface="StarSymbol"/>
               <a:buAutoNum type="alphaUcParenR"/>
             </a:pPr>
             <a:r>
-              <a:rPr lang="en-AU" sz="3600">
+              <a:rPr lang="en-AU" sz="3600" strike="noStrike">
                 <a:latin typeface="Arial"/>
               </a:rPr>
               <a:t> </a:t>
             </a:r>
             <a:r>
-              <a:rPr lang="en-AU" sz="3600">
-                <a:latin typeface="Arial"/>
-              </a:rPr>
-              <a:t>Buy a physical machine and use it.</a:t>
+              <a:rPr lang="en-AU" sz="3600" strike="noStrike">
+                <a:latin typeface="Arial"/>
+              </a:rPr>
+              <a:t>Ben likes a life more complicated</a:t>
             </a:r>
             <a:endParaRPr/>
           </a:p>
           <a:p>
             <a:pPr>
+              <a:lnSpc>
+                <a:spcPct val="100000"/>
+              </a:lnSpc>
               <a:buFont typeface="StarSymbol"/>
               <a:buAutoNum type="alphaUcParenR"/>
             </a:pPr>
             <a:r>
-              <a:rPr lang="en-AU" sz="3600">
+              <a:rPr lang="en-AU" sz="3600" strike="noStrike">
                 <a:latin typeface="Arial"/>
               </a:rPr>
               <a:t> </a:t>
             </a:r>
             <a:r>
-              <a:rPr lang="en-AU" sz="3600">
-                <a:latin typeface="Arial"/>
-              </a:rPr>
-              <a:t>Make a support call to NeCTAR</a:t>
+              <a:rPr lang="en-AU" sz="3600" strike="noStrike">
+                <a:latin typeface="Arial"/>
+              </a:rPr>
+              <a:t>The state of the machine is not captured</a:t>
             </a:r>
             <a:endParaRPr/>
           </a:p>
           <a:p>
             <a:pPr>
+              <a:lnSpc>
+                <a:spcPct val="100000"/>
+              </a:lnSpc>
               <a:buFont typeface="StarSymbol"/>
               <a:buAutoNum type="alphaUcParenR"/>
             </a:pPr>
             <a:r>
-              <a:rPr lang="en-AU" sz="3600">
+              <a:rPr lang="en-AU" sz="3600" strike="noStrike">
                 <a:latin typeface="Arial"/>
               </a:rPr>
               <a:t> </a:t>
             </a:r>
             <a:r>
-              <a:rPr lang="en-AU" sz="3600">
-                <a:latin typeface="Arial"/>
-              </a:rPr>
-              <a:t>Pay NeCTAR for more network</a:t>
+              <a:rPr lang="en-AU" sz="3600" strike="noStrike">
+                <a:latin typeface="Arial"/>
+              </a:rPr>
+              <a:t>Cosmic rays can flip their bits</a:t>
             </a:r>
             <a:endParaRPr/>
           </a:p>
           <a:p>
             <a:pPr>
-              <a:buFont typeface="StarSymbol"/>
-              <a:buAutoNum type="alphaUcParenR"/>
+              <a:lnSpc>
+                <a:spcPct val="100000"/>
+              </a:lnSpc>
             </a:pPr>
             <a:endParaRPr/>
           </a:p>
           <a:p>
-            <a:pPr algn="ctr"/>
-            <a:r>
-              <a:rPr lang="en-AU" sz="3200">
+            <a:pPr algn="ctr">
+              <a:lnSpc>
+                <a:spcPct val="100000"/>
+              </a:lnSpc>
+            </a:pPr>
+            <a:r>
+              <a:rPr lang="en-AU" sz="3200" strike="noStrike">
                 <a:latin typeface="Arial"/>
               </a:rPr>
               <a:t>?</a:t>
@@ -2164,14 +2643,14 @@
       </p:grpSpPr>
       <p:sp>
         <p:nvSpPr>
-          <p:cNvPr id="45" name="TextShape 1"/>
-          <p:cNvSpPr txBox="1"/>
+          <p:cNvPr id="43" name="CustomShape 1"/>
+          <p:cNvSpPr/>
           <p:nvPr/>
         </p:nvSpPr>
         <p:spPr>
           <a:xfrm>
             <a:off x="504000" y="301320"/>
-            <a:ext cx="9071640" cy="1262160"/>
+            <a:ext cx="9071280" cy="1261800"/>
           </a:xfrm>
           <a:prstGeom prst="rect">
             <a:avLst/>
@@ -2181,29 +2660,36 @@
             <a:noFill/>
           </a:ln>
         </p:spPr>
+        <p:style>
+          <a:lnRef idx="0"/>
+          <a:fillRef idx="0"/>
+          <a:effectRef idx="0"/>
+          <a:fontRef idx="minor"/>
+        </p:style>
         <p:txBody>
           <a:bodyPr lIns="0" rIns="0" tIns="0" bIns="0" anchor="ctr"/>
           <a:p>
-            <a:r>
-              <a:rPr b="1" lang="en-AU" sz="4400">
-                <a:latin typeface="Arial"/>
-              </a:rPr>
-              <a:t>Question 4</a:t>
-            </a:r>
-            <a:endParaRPr/>
-          </a:p>
-        </p:txBody>
-      </p:sp>
-      <p:sp>
-        <p:nvSpPr>
-          <p:cNvPr id="46" name="TextShape 2"/>
-          <p:cNvSpPr txBox="1"/>
+            <a:pPr algn="ctr"/>
+            <a:r>
+              <a:rPr b="1" lang="en-AU" sz="4400" strike="noStrike">
+                <a:latin typeface="Arial"/>
+              </a:rPr>
+              <a:t>Exercise 4</a:t>
+            </a:r>
+            <a:endParaRPr/>
+          </a:p>
+        </p:txBody>
+      </p:sp>
+      <p:sp>
+        <p:nvSpPr>
+          <p:cNvPr id="44" name="CustomShape 2"/>
+          <p:cNvSpPr/>
           <p:nvPr/>
         </p:nvSpPr>
         <p:spPr>
           <a:xfrm>
-            <a:off x="504000" y="1500840"/>
-            <a:ext cx="9071640" cy="4921200"/>
+            <a:off x="504000" y="1755360"/>
+            <a:ext cx="9071280" cy="4411800"/>
           </a:xfrm>
           <a:prstGeom prst="rect">
             <a:avLst/>
@@ -2213,129 +2699,46 @@
             <a:noFill/>
           </a:ln>
         </p:spPr>
+        <p:style>
+          <a:lnRef idx="0"/>
+          <a:fillRef idx="0"/>
+          <a:effectRef idx="0"/>
+          <a:fontRef idx="minor"/>
+        </p:style>
         <p:txBody>
           <a:bodyPr lIns="0" rIns="0" tIns="0" bIns="0" anchor="ctr"/>
           <a:p>
-            <a:r>
-              <a:rPr lang="en-AU" sz="3600">
-                <a:latin typeface="Arial"/>
-              </a:rPr>
-              <a:t>How do you get access to bigger machines?</a:t>
-            </a:r>
-            <a:endParaRPr/>
-          </a:p>
-          <a:p>
-            <a:endParaRPr/>
-          </a:p>
-          <a:p>
-            <a:pPr>
-              <a:buFont typeface="StarSymbol"/>
-              <a:buAutoNum type="alphaUcParenR"/>
-            </a:pPr>
-            <a:r>
-              <a:rPr lang="en-AU" sz="3600">
-                <a:latin typeface="Arial"/>
-              </a:rPr>
-              <a:t> </a:t>
-            </a:r>
-            <a:r>
-              <a:rPr lang="en-AU" sz="3600">
-                <a:latin typeface="Arial"/>
-              </a:rPr>
-              <a:t>You can't: it's hopeless!</a:t>
-            </a:r>
-            <a:endParaRPr/>
-          </a:p>
-          <a:p>
-            <a:pPr>
-              <a:buFont typeface="StarSymbol"/>
-              <a:buAutoNum type="alphaUcParenR"/>
-            </a:pPr>
-            <a:r>
-              <a:rPr lang="en-AU" sz="3600">
-                <a:latin typeface="Arial"/>
-              </a:rPr>
-              <a:t> </a:t>
-            </a:r>
-            <a:r>
-              <a:rPr lang="en-AU" sz="3600">
-                <a:latin typeface="Arial"/>
-              </a:rPr>
-              <a:t>Offer NeCTAR a load of money </a:t>
-            </a:r>
-            <a:endParaRPr/>
-          </a:p>
-          <a:p>
-            <a:pPr>
-              <a:buFont typeface="StarSymbol"/>
-              <a:buAutoNum type="alphaUcParenR"/>
-            </a:pPr>
-            <a:r>
-              <a:rPr lang="en-AU" sz="3600">
-                <a:latin typeface="Arial"/>
-              </a:rPr>
-              <a:t> </a:t>
-            </a:r>
-            <a:r>
-              <a:rPr lang="en-AU" sz="3600">
-                <a:latin typeface="Arial"/>
-              </a:rPr>
-              <a:t>Reach for your credit card and call Dell</a:t>
-            </a:r>
-            <a:endParaRPr/>
-          </a:p>
-          <a:p>
-            <a:pPr>
-              <a:buFont typeface="StarSymbol"/>
-              <a:buAutoNum type="alphaUcParenR"/>
-            </a:pPr>
-            <a:r>
-              <a:rPr lang="en-AU" sz="3600">
-                <a:latin typeface="Arial"/>
-              </a:rPr>
-              <a:t> </a:t>
-            </a:r>
-            <a:r>
-              <a:rPr lang="en-AU" sz="3600">
-                <a:latin typeface="Arial"/>
-              </a:rPr>
-              <a:t>Make a support call to NeCTAR</a:t>
-            </a:r>
-            <a:endParaRPr/>
-          </a:p>
-          <a:p>
-            <a:pPr>
-              <a:buFont typeface="StarSymbol"/>
-              <a:buAutoNum type="alphaUcParenR"/>
-            </a:pPr>
-            <a:r>
-              <a:rPr lang="en-AU" sz="3600">
-                <a:latin typeface="Arial"/>
-              </a:rPr>
-              <a:t> </a:t>
-            </a:r>
-            <a:r>
-              <a:rPr lang="en-AU" sz="3600">
-                <a:latin typeface="Arial"/>
-              </a:rPr>
-              <a:t>Go to the allocation tab and complete an allocation request</a:t>
-            </a:r>
-            <a:endParaRPr/>
-          </a:p>
-          <a:p>
-            <a:pPr>
-              <a:buFont typeface="StarSymbol"/>
-              <a:buAutoNum type="alphaUcParenR"/>
-            </a:pPr>
-            <a:endParaRPr/>
-          </a:p>
-          <a:p>
             <a:pPr algn="ctr"/>
             <a:r>
-              <a:rPr lang="en-AU" sz="3200">
-                <a:latin typeface="Arial"/>
-              </a:rPr>
-              <a:t>?</a:t>
+              <a:rPr lang="en-AU" sz="3600" strike="noStrike">
+                <a:latin typeface="Arial"/>
+              </a:rPr>
+              <a:t>Power down your VM</a:t>
+            </a:r>
+            <a:r>
+              <a:rPr lang="en-AU" sz="3600" strike="noStrike">
+                <a:latin typeface="Arial"/>
+              </a:rPr>
+              <a:t>
+</a:t>
+            </a:r>
+            <a:r>
+              <a:rPr lang="en-AU" sz="3600" strike="sngStrike">
+                <a:solidFill>
+                  <a:srgbClr val="800000"/>
+                </a:solidFill>
+                <a:latin typeface="Arial"/>
+              </a:rPr>
+              <a:t>do not terminate it</a:t>
+            </a:r>
+            <a:r>
+              <a:rPr lang="en-AU" sz="3600" strike="noStrike">
+                <a:solidFill>
+                  <a:srgbClr val="800000"/>
+                </a:solidFill>
+                <a:latin typeface="Arial"/>
+              </a:rPr>
+              <a:t>!</a:t>
             </a:r>
             <a:endParaRPr/>
           </a:p>
@@ -2350,6 +2753,1043 @@
           <p:childTnLst>
             <p:seq>
               <p:cTn id="8" nodeType="mainSeq"/>
+              <p:prevCondLst>
+                <p:cond delay="0" evt="onPrev">
+                  <p:tgtEl>
+                    <p:sldTgt/>
+                  </p:tgtEl>
+                </p:cond>
+              </p:prevCondLst>
+              <p:nextCondLst>
+                <p:cond delay="0" evt="onNext">
+                  <p:tgtEl>
+                    <p:sldTgt/>
+                  </p:tgtEl>
+                </p:cond>
+              </p:nextCondLst>
+            </p:seq>
+          </p:childTnLst>
+        </p:cTn>
+      </p:par>
+    </p:tnLst>
+  </p:timing>
+</p:sld>
+</file>
+
+<file path=ppt/slides/slide5.xml><?xml version="1.0" encoding="utf-8"?>
+<p:sld xmlns:a="http://schemas.openxmlformats.org/drawingml/2006/main" xmlns:p="http://schemas.openxmlformats.org/presentationml/2006/main" xmlns:r="http://schemas.openxmlformats.org/officeDocument/2006/relationships">
+  <p:cSld>
+    <p:spTree>
+      <p:nvGrpSpPr>
+        <p:cNvPr id="1" name=""/>
+        <p:cNvGrpSpPr/>
+        <p:nvPr/>
+      </p:nvGrpSpPr>
+      <p:grpSpPr>
+        <a:xfrm>
+          <a:off x="0" y="0"/>
+          <a:ext cx="0" cy="0"/>
+          <a:chOff x="0" y="0"/>
+          <a:chExt cx="0" cy="0"/>
+        </a:xfrm>
+      </p:grpSpPr>
+      <p:sp>
+        <p:nvSpPr>
+          <p:cNvPr id="45" name="CustomShape 1"/>
+          <p:cNvSpPr/>
+          <p:nvPr/>
+        </p:nvSpPr>
+        <p:spPr>
+          <a:xfrm>
+            <a:off x="504000" y="301320"/>
+            <a:ext cx="9071280" cy="1261800"/>
+          </a:xfrm>
+          <a:prstGeom prst="rect">
+            <a:avLst/>
+          </a:prstGeom>
+          <a:noFill/>
+          <a:ln>
+            <a:noFill/>
+          </a:ln>
+        </p:spPr>
+        <p:style>
+          <a:lnRef idx="0"/>
+          <a:fillRef idx="0"/>
+          <a:effectRef idx="0"/>
+          <a:fontRef idx="minor"/>
+        </p:style>
+        <p:txBody>
+          <a:bodyPr lIns="0" rIns="0" tIns="0" bIns="0" anchor="ctr"/>
+          <a:p>
+            <a:r>
+              <a:rPr b="1" lang="en-AU" sz="4400" strike="noStrike">
+                <a:latin typeface="Arial"/>
+              </a:rPr>
+              <a:t>Question 2</a:t>
+            </a:r>
+            <a:endParaRPr/>
+          </a:p>
+        </p:txBody>
+      </p:sp>
+      <p:sp>
+        <p:nvSpPr>
+          <p:cNvPr id="46" name="CustomShape 2"/>
+          <p:cNvSpPr/>
+          <p:nvPr/>
+        </p:nvSpPr>
+        <p:spPr>
+          <a:xfrm>
+            <a:off x="504000" y="934920"/>
+            <a:ext cx="9071280" cy="6052320"/>
+          </a:xfrm>
+          <a:prstGeom prst="rect">
+            <a:avLst/>
+          </a:prstGeom>
+          <a:noFill/>
+          <a:ln>
+            <a:noFill/>
+          </a:ln>
+        </p:spPr>
+        <p:style>
+          <a:lnRef idx="0"/>
+          <a:fillRef idx="0"/>
+          <a:effectRef idx="0"/>
+          <a:fontRef idx="minor"/>
+        </p:style>
+        <p:txBody>
+          <a:bodyPr lIns="0" rIns="0" tIns="0" bIns="0" anchor="ctr"/>
+          <a:p>
+            <a:endParaRPr/>
+          </a:p>
+          <a:p>
+            <a:r>
+              <a:rPr lang="en-AU" sz="3600" strike="noStrike">
+                <a:latin typeface="Arial"/>
+              </a:rPr>
+              <a:t>What's a big problem with Anna's new approach?</a:t>
+            </a:r>
+            <a:endParaRPr/>
+          </a:p>
+          <a:p>
+            <a:endParaRPr/>
+          </a:p>
+          <a:p>
+            <a:pPr>
+              <a:lnSpc>
+                <a:spcPct val="100000"/>
+              </a:lnSpc>
+              <a:buFont typeface="StarSymbol"/>
+              <a:buAutoNum type="alphaUcParenR"/>
+            </a:pPr>
+            <a:r>
+              <a:rPr lang="en-AU" sz="3200" strike="noStrike">
+                <a:latin typeface="Arial"/>
+              </a:rPr>
+              <a:t> </a:t>
+            </a:r>
+            <a:r>
+              <a:rPr lang="en-AU" sz="3200" strike="noStrike">
+                <a:latin typeface="Arial"/>
+              </a:rPr>
+              <a:t>You may forget to start your instance up again</a:t>
+            </a:r>
+            <a:endParaRPr/>
+          </a:p>
+          <a:p>
+            <a:pPr>
+              <a:lnSpc>
+                <a:spcPct val="100000"/>
+              </a:lnSpc>
+              <a:buFont typeface="StarSymbol"/>
+              <a:buAutoNum type="alphaUcParenR"/>
+            </a:pPr>
+            <a:r>
+              <a:rPr lang="en-AU" sz="3200" strike="noStrike">
+                <a:latin typeface="Arial"/>
+              </a:rPr>
+              <a:t> </a:t>
+            </a:r>
+            <a:r>
+              <a:rPr lang="en-AU" sz="3200" strike="noStrike">
+                <a:latin typeface="Arial"/>
+              </a:rPr>
+              <a:t>The powered off machine might not have saved its state properly</a:t>
+            </a:r>
+            <a:endParaRPr/>
+          </a:p>
+          <a:p>
+            <a:pPr>
+              <a:lnSpc>
+                <a:spcPct val="100000"/>
+              </a:lnSpc>
+              <a:buFont typeface="StarSymbol"/>
+              <a:buAutoNum type="alphaUcParenR"/>
+            </a:pPr>
+            <a:r>
+              <a:rPr lang="en-AU" sz="3200" strike="noStrike">
+                <a:latin typeface="Arial"/>
+              </a:rPr>
+              <a:t> </a:t>
+            </a:r>
+            <a:r>
+              <a:rPr lang="en-AU" sz="3200" strike="noStrike">
+                <a:latin typeface="Arial"/>
+              </a:rPr>
+              <a:t>The saved disk image is powerless</a:t>
+            </a:r>
+            <a:endParaRPr/>
+          </a:p>
+          <a:p>
+            <a:pPr>
+              <a:lnSpc>
+                <a:spcPct val="100000"/>
+              </a:lnSpc>
+              <a:buFont typeface="StarSymbol"/>
+              <a:buAutoNum type="alphaUcParenR"/>
+            </a:pPr>
+            <a:r>
+              <a:rPr lang="en-AU" sz="3200" strike="noStrike">
+                <a:latin typeface="Arial"/>
+              </a:rPr>
+              <a:t> </a:t>
+            </a:r>
+            <a:r>
+              <a:rPr lang="en-AU" sz="3200" strike="noStrike">
+                <a:latin typeface="Arial"/>
+              </a:rPr>
+              <a:t>The process overhead is too high</a:t>
+            </a:r>
+            <a:endParaRPr/>
+          </a:p>
+          <a:p>
+            <a:pPr>
+              <a:lnSpc>
+                <a:spcPct val="100000"/>
+              </a:lnSpc>
+              <a:buFont typeface="StarSymbol"/>
+              <a:buAutoNum type="alphaUcParenR"/>
+            </a:pPr>
+            <a:r>
+              <a:rPr lang="en-AU" sz="3200" strike="noStrike">
+                <a:latin typeface="Arial"/>
+              </a:rPr>
+              <a:t>  </a:t>
+            </a:r>
+            <a:r>
+              <a:rPr lang="en-AU" sz="3200" strike="noStrike">
+                <a:latin typeface="Arial"/>
+              </a:rPr>
+              <a:t>How can you make a copy of a powered off disk?</a:t>
+            </a:r>
+            <a:endParaRPr/>
+          </a:p>
+          <a:p>
+            <a:pPr>
+              <a:lnSpc>
+                <a:spcPct val="100000"/>
+              </a:lnSpc>
+            </a:pPr>
+            <a:endParaRPr/>
+          </a:p>
+          <a:p>
+            <a:pPr algn="ctr">
+              <a:lnSpc>
+                <a:spcPct val="100000"/>
+              </a:lnSpc>
+            </a:pPr>
+            <a:r>
+              <a:rPr lang="en-AU" sz="3200" strike="noStrike">
+                <a:latin typeface="Arial"/>
+              </a:rPr>
+              <a:t>?</a:t>
+            </a:r>
+            <a:endParaRPr/>
+          </a:p>
+        </p:txBody>
+      </p:sp>
+    </p:spTree>
+  </p:cSld>
+  <p:timing>
+    <p:tnLst>
+      <p:par>
+        <p:cTn id="9" dur="indefinite" restart="never" nodeType="tmRoot">
+          <p:childTnLst>
+            <p:seq>
+              <p:cTn id="10" nodeType="mainSeq"/>
+              <p:prevCondLst>
+                <p:cond delay="0" evt="onPrev">
+                  <p:tgtEl>
+                    <p:sldTgt/>
+                  </p:tgtEl>
+                </p:cond>
+              </p:prevCondLst>
+              <p:nextCondLst>
+                <p:cond delay="0" evt="onNext">
+                  <p:tgtEl>
+                    <p:sldTgt/>
+                  </p:tgtEl>
+                </p:cond>
+              </p:nextCondLst>
+            </p:seq>
+          </p:childTnLst>
+        </p:cTn>
+      </p:par>
+    </p:tnLst>
+  </p:timing>
+</p:sld>
+</file>
+
+<file path=ppt/slides/slide6.xml><?xml version="1.0" encoding="utf-8"?>
+<p:sld xmlns:a="http://schemas.openxmlformats.org/drawingml/2006/main" xmlns:p="http://schemas.openxmlformats.org/presentationml/2006/main" xmlns:r="http://schemas.openxmlformats.org/officeDocument/2006/relationships">
+  <p:cSld>
+    <p:spTree>
+      <p:nvGrpSpPr>
+        <p:cNvPr id="1" name=""/>
+        <p:cNvGrpSpPr/>
+        <p:nvPr/>
+      </p:nvGrpSpPr>
+      <p:grpSpPr>
+        <a:xfrm>
+          <a:off x="0" y="0"/>
+          <a:ext cx="0" cy="0"/>
+          <a:chOff x="0" y="0"/>
+          <a:chExt cx="0" cy="0"/>
+        </a:xfrm>
+      </p:grpSpPr>
+      <p:sp>
+        <p:nvSpPr>
+          <p:cNvPr id="47" name="CustomShape 1"/>
+          <p:cNvSpPr/>
+          <p:nvPr/>
+        </p:nvSpPr>
+        <p:spPr>
+          <a:xfrm>
+            <a:off x="504000" y="301320"/>
+            <a:ext cx="9071280" cy="1261800"/>
+          </a:xfrm>
+          <a:prstGeom prst="rect">
+            <a:avLst/>
+          </a:prstGeom>
+          <a:noFill/>
+          <a:ln>
+            <a:noFill/>
+          </a:ln>
+        </p:spPr>
+        <p:style>
+          <a:lnRef idx="0"/>
+          <a:fillRef idx="0"/>
+          <a:effectRef idx="0"/>
+          <a:fontRef idx="minor"/>
+        </p:style>
+        <p:txBody>
+          <a:bodyPr lIns="0" rIns="0" tIns="0" bIns="0" anchor="ctr"/>
+          <a:p>
+            <a:pPr algn="ctr"/>
+            <a:r>
+              <a:rPr b="1" lang="en-AU" sz="4400" strike="noStrike">
+                <a:latin typeface="Arial"/>
+              </a:rPr>
+              <a:t>Exercise 5</a:t>
+            </a:r>
+            <a:endParaRPr/>
+          </a:p>
+        </p:txBody>
+      </p:sp>
+      <p:sp>
+        <p:nvSpPr>
+          <p:cNvPr id="48" name="CustomShape 2"/>
+          <p:cNvSpPr/>
+          <p:nvPr/>
+        </p:nvSpPr>
+        <p:spPr>
+          <a:xfrm>
+            <a:off x="504000" y="1755360"/>
+            <a:ext cx="9071280" cy="4411800"/>
+          </a:xfrm>
+          <a:prstGeom prst="rect">
+            <a:avLst/>
+          </a:prstGeom>
+          <a:noFill/>
+          <a:ln>
+            <a:noFill/>
+          </a:ln>
+        </p:spPr>
+        <p:style>
+          <a:lnRef idx="0"/>
+          <a:fillRef idx="0"/>
+          <a:effectRef idx="0"/>
+          <a:fontRef idx="minor"/>
+        </p:style>
+        <p:txBody>
+          <a:bodyPr lIns="0" rIns="0" tIns="0" bIns="0" anchor="ctr"/>
+          <a:p>
+            <a:pPr algn="ctr"/>
+            <a:r>
+              <a:rPr lang="en-AU" sz="3600" strike="noStrike">
+                <a:latin typeface="Arial"/>
+              </a:rPr>
+              <a:t>Terminate your VM, and launch a new one from your snapshot.</a:t>
+            </a:r>
+            <a:endParaRPr/>
+          </a:p>
+        </p:txBody>
+      </p:sp>
+    </p:spTree>
+  </p:cSld>
+  <p:timing>
+    <p:tnLst>
+      <p:par>
+        <p:cTn id="11" dur="indefinite" restart="never" nodeType="tmRoot">
+          <p:childTnLst>
+            <p:seq>
+              <p:cTn id="12" nodeType="mainSeq"/>
+              <p:prevCondLst>
+                <p:cond delay="0" evt="onPrev">
+                  <p:tgtEl>
+                    <p:sldTgt/>
+                  </p:tgtEl>
+                </p:cond>
+              </p:prevCondLst>
+              <p:nextCondLst>
+                <p:cond delay="0" evt="onNext">
+                  <p:tgtEl>
+                    <p:sldTgt/>
+                  </p:tgtEl>
+                </p:cond>
+              </p:nextCondLst>
+            </p:seq>
+          </p:childTnLst>
+        </p:cTn>
+      </p:par>
+    </p:tnLst>
+  </p:timing>
+</p:sld>
+</file>
+
+<file path=ppt/slides/slide7.xml><?xml version="1.0" encoding="utf-8"?>
+<p:sld xmlns:a="http://schemas.openxmlformats.org/drawingml/2006/main" xmlns:p="http://schemas.openxmlformats.org/presentationml/2006/main" xmlns:r="http://schemas.openxmlformats.org/officeDocument/2006/relationships">
+  <p:cSld>
+    <p:spTree>
+      <p:nvGrpSpPr>
+        <p:cNvPr id="1" name=""/>
+        <p:cNvGrpSpPr/>
+        <p:nvPr/>
+      </p:nvGrpSpPr>
+      <p:grpSpPr>
+        <a:xfrm>
+          <a:off x="0" y="0"/>
+          <a:ext cx="0" cy="0"/>
+          <a:chOff x="0" y="0"/>
+          <a:chExt cx="0" cy="0"/>
+        </a:xfrm>
+      </p:grpSpPr>
+      <p:sp>
+        <p:nvSpPr>
+          <p:cNvPr id="49" name="CustomShape 1"/>
+          <p:cNvSpPr/>
+          <p:nvPr/>
+        </p:nvSpPr>
+        <p:spPr>
+          <a:xfrm>
+            <a:off x="504000" y="301320"/>
+            <a:ext cx="9071280" cy="1261800"/>
+          </a:xfrm>
+          <a:prstGeom prst="rect">
+            <a:avLst/>
+          </a:prstGeom>
+          <a:noFill/>
+          <a:ln>
+            <a:noFill/>
+          </a:ln>
+        </p:spPr>
+        <p:style>
+          <a:lnRef idx="0"/>
+          <a:fillRef idx="0"/>
+          <a:effectRef idx="0"/>
+          <a:fontRef idx="minor"/>
+        </p:style>
+        <p:txBody>
+          <a:bodyPr lIns="0" rIns="0" tIns="0" bIns="0" anchor="ctr"/>
+          <a:p>
+            <a:r>
+              <a:rPr b="1" lang="en-AU" sz="4400" strike="noStrike">
+                <a:latin typeface="Arial"/>
+              </a:rPr>
+              <a:t>Question 3</a:t>
+            </a:r>
+            <a:endParaRPr/>
+          </a:p>
+        </p:txBody>
+      </p:sp>
+      <p:sp>
+        <p:nvSpPr>
+          <p:cNvPr id="50" name="CustomShape 2"/>
+          <p:cNvSpPr/>
+          <p:nvPr/>
+        </p:nvSpPr>
+        <p:spPr>
+          <a:xfrm>
+            <a:off x="504000" y="1698840"/>
+            <a:ext cx="9071280" cy="4524840"/>
+          </a:xfrm>
+          <a:prstGeom prst="rect">
+            <a:avLst/>
+          </a:prstGeom>
+          <a:noFill/>
+          <a:ln>
+            <a:noFill/>
+          </a:ln>
+        </p:spPr>
+        <p:style>
+          <a:lnRef idx="0"/>
+          <a:fillRef idx="0"/>
+          <a:effectRef idx="0"/>
+          <a:fontRef idx="minor"/>
+        </p:style>
+        <p:txBody>
+          <a:bodyPr lIns="0" rIns="0" tIns="0" bIns="0" anchor="ctr"/>
+          <a:p>
+            <a:r>
+              <a:rPr lang="en-AU" sz="3600" strike="noStrike">
+                <a:latin typeface="Arial"/>
+              </a:rPr>
+              <a:t>How can Anna fix her popularity problem?</a:t>
+            </a:r>
+            <a:endParaRPr/>
+          </a:p>
+          <a:p>
+            <a:endParaRPr/>
+          </a:p>
+          <a:p>
+            <a:pPr>
+              <a:lnSpc>
+                <a:spcPct val="100000"/>
+              </a:lnSpc>
+              <a:buFont typeface="StarSymbol"/>
+              <a:buAutoNum type="alphaUcParenR"/>
+            </a:pPr>
+            <a:r>
+              <a:rPr lang="en-AU" sz="3600" strike="noStrike">
+                <a:latin typeface="Arial"/>
+              </a:rPr>
+              <a:t> </a:t>
+            </a:r>
+            <a:r>
+              <a:rPr lang="en-AU" sz="3600" strike="noStrike">
+                <a:latin typeface="Arial"/>
+              </a:rPr>
+              <a:t>Nothing</a:t>
+            </a:r>
+            <a:endParaRPr/>
+          </a:p>
+          <a:p>
+            <a:pPr>
+              <a:lnSpc>
+                <a:spcPct val="100000"/>
+              </a:lnSpc>
+              <a:buFont typeface="StarSymbol"/>
+              <a:buAutoNum type="alphaUcParenR"/>
+            </a:pPr>
+            <a:r>
+              <a:rPr lang="en-AU" sz="3600" strike="noStrike">
+                <a:latin typeface="Arial"/>
+              </a:rPr>
+              <a:t> </a:t>
+            </a:r>
+            <a:r>
+              <a:rPr lang="en-AU" sz="3600" strike="noStrike">
+                <a:latin typeface="Arial"/>
+              </a:rPr>
+              <a:t>Upgrade to a more powerful machine</a:t>
+            </a:r>
+            <a:endParaRPr/>
+          </a:p>
+          <a:p>
+            <a:pPr>
+              <a:lnSpc>
+                <a:spcPct val="100000"/>
+              </a:lnSpc>
+              <a:buFont typeface="StarSymbol"/>
+              <a:buAutoNum type="alphaUcParenR"/>
+            </a:pPr>
+            <a:r>
+              <a:rPr lang="en-AU" sz="3600" strike="noStrike">
+                <a:latin typeface="Arial"/>
+              </a:rPr>
+              <a:t> </a:t>
+            </a:r>
+            <a:r>
+              <a:rPr lang="en-AU" sz="3600" strike="noStrike">
+                <a:latin typeface="Arial"/>
+              </a:rPr>
+              <a:t>Buy a physical machine and use it.</a:t>
+            </a:r>
+            <a:endParaRPr/>
+          </a:p>
+          <a:p>
+            <a:pPr>
+              <a:lnSpc>
+                <a:spcPct val="100000"/>
+              </a:lnSpc>
+              <a:buFont typeface="StarSymbol"/>
+              <a:buAutoNum type="alphaUcParenR"/>
+            </a:pPr>
+            <a:r>
+              <a:rPr lang="en-AU" sz="3600" strike="noStrike">
+                <a:latin typeface="Arial"/>
+              </a:rPr>
+              <a:t> </a:t>
+            </a:r>
+            <a:r>
+              <a:rPr lang="en-AU" sz="3600" strike="noStrike">
+                <a:latin typeface="Arial"/>
+              </a:rPr>
+              <a:t>Make a support call to NeCTAR</a:t>
+            </a:r>
+            <a:endParaRPr/>
+          </a:p>
+          <a:p>
+            <a:pPr>
+              <a:lnSpc>
+                <a:spcPct val="100000"/>
+              </a:lnSpc>
+              <a:buFont typeface="StarSymbol"/>
+              <a:buAutoNum type="alphaUcParenR"/>
+            </a:pPr>
+            <a:r>
+              <a:rPr lang="en-AU" sz="3600" strike="noStrike">
+                <a:latin typeface="Arial"/>
+              </a:rPr>
+              <a:t> </a:t>
+            </a:r>
+            <a:r>
+              <a:rPr lang="en-AU" sz="3600" strike="noStrike">
+                <a:latin typeface="Arial"/>
+              </a:rPr>
+              <a:t>Pay NeCTAR for more network</a:t>
+            </a:r>
+            <a:endParaRPr/>
+          </a:p>
+          <a:p>
+            <a:pPr>
+              <a:lnSpc>
+                <a:spcPct val="100000"/>
+              </a:lnSpc>
+            </a:pPr>
+            <a:endParaRPr/>
+          </a:p>
+          <a:p>
+            <a:pPr algn="ctr">
+              <a:lnSpc>
+                <a:spcPct val="100000"/>
+              </a:lnSpc>
+            </a:pPr>
+            <a:r>
+              <a:rPr lang="en-AU" sz="3200" strike="noStrike">
+                <a:latin typeface="Arial"/>
+              </a:rPr>
+              <a:t>?</a:t>
+            </a:r>
+            <a:endParaRPr/>
+          </a:p>
+        </p:txBody>
+      </p:sp>
+    </p:spTree>
+  </p:cSld>
+  <p:timing>
+    <p:tnLst>
+      <p:par>
+        <p:cTn id="13" dur="indefinite" restart="never" nodeType="tmRoot">
+          <p:childTnLst>
+            <p:seq>
+              <p:cTn id="14" nodeType="mainSeq"/>
+              <p:prevCondLst>
+                <p:cond delay="0" evt="onPrev">
+                  <p:tgtEl>
+                    <p:sldTgt/>
+                  </p:tgtEl>
+                </p:cond>
+              </p:prevCondLst>
+              <p:nextCondLst>
+                <p:cond delay="0" evt="onNext">
+                  <p:tgtEl>
+                    <p:sldTgt/>
+                  </p:tgtEl>
+                </p:cond>
+              </p:nextCondLst>
+            </p:seq>
+          </p:childTnLst>
+        </p:cTn>
+      </p:par>
+    </p:tnLst>
+  </p:timing>
+</p:sld>
+</file>
+
+<file path=ppt/slides/slide8.xml><?xml version="1.0" encoding="utf-8"?>
+<p:sld xmlns:a="http://schemas.openxmlformats.org/drawingml/2006/main" xmlns:p="http://schemas.openxmlformats.org/presentationml/2006/main" xmlns:r="http://schemas.openxmlformats.org/officeDocument/2006/relationships">
+  <p:cSld>
+    <p:spTree>
+      <p:nvGrpSpPr>
+        <p:cNvPr id="1" name=""/>
+        <p:cNvGrpSpPr/>
+        <p:nvPr/>
+      </p:nvGrpSpPr>
+      <p:grpSpPr>
+        <a:xfrm>
+          <a:off x="0" y="0"/>
+          <a:ext cx="0" cy="0"/>
+          <a:chOff x="0" y="0"/>
+          <a:chExt cx="0" cy="0"/>
+        </a:xfrm>
+      </p:grpSpPr>
+      <p:sp>
+        <p:nvSpPr>
+          <p:cNvPr id="51" name="CustomShape 1"/>
+          <p:cNvSpPr/>
+          <p:nvPr/>
+        </p:nvSpPr>
+        <p:spPr>
+          <a:xfrm>
+            <a:off x="504000" y="301320"/>
+            <a:ext cx="9071280" cy="1261800"/>
+          </a:xfrm>
+          <a:prstGeom prst="rect">
+            <a:avLst/>
+          </a:prstGeom>
+          <a:noFill/>
+          <a:ln>
+            <a:noFill/>
+          </a:ln>
+        </p:spPr>
+        <p:style>
+          <a:lnRef idx="0"/>
+          <a:fillRef idx="0"/>
+          <a:effectRef idx="0"/>
+          <a:fontRef idx="minor"/>
+        </p:style>
+        <p:txBody>
+          <a:bodyPr lIns="0" rIns="0" tIns="0" bIns="0" anchor="ctr"/>
+          <a:p>
+            <a:pPr algn="ctr"/>
+            <a:r>
+              <a:rPr b="1" lang="en-AU" sz="4400" strike="noStrike">
+                <a:latin typeface="Arial"/>
+              </a:rPr>
+              <a:t>Exercise 6</a:t>
+            </a:r>
+            <a:endParaRPr/>
+          </a:p>
+        </p:txBody>
+      </p:sp>
+      <p:sp>
+        <p:nvSpPr>
+          <p:cNvPr id="52" name="CustomShape 2"/>
+          <p:cNvSpPr/>
+          <p:nvPr/>
+        </p:nvSpPr>
+        <p:spPr>
+          <a:xfrm>
+            <a:off x="504000" y="1755360"/>
+            <a:ext cx="9071280" cy="4411800"/>
+          </a:xfrm>
+          <a:prstGeom prst="rect">
+            <a:avLst/>
+          </a:prstGeom>
+          <a:noFill/>
+          <a:ln>
+            <a:noFill/>
+          </a:ln>
+        </p:spPr>
+        <p:style>
+          <a:lnRef idx="0"/>
+          <a:fillRef idx="0"/>
+          <a:effectRef idx="0"/>
+          <a:fontRef idx="minor"/>
+        </p:style>
+        <p:txBody>
+          <a:bodyPr lIns="0" rIns="0" tIns="0" bIns="0" anchor="ctr"/>
+          <a:p>
+            <a:pPr algn="ctr"/>
+            <a:r>
+              <a:rPr lang="en-AU" sz="3600" strike="noStrike">
+                <a:latin typeface="Arial"/>
+              </a:rPr>
+              <a:t>Terminate your VM, and launch a new one from your snapshot, this time using the largest flavor that you are allowed.</a:t>
+            </a:r>
+            <a:endParaRPr/>
+          </a:p>
+        </p:txBody>
+      </p:sp>
+    </p:spTree>
+  </p:cSld>
+  <p:timing>
+    <p:tnLst>
+      <p:par>
+        <p:cTn id="15" dur="indefinite" restart="never" nodeType="tmRoot">
+          <p:childTnLst>
+            <p:seq>
+              <p:cTn id="16" nodeType="mainSeq"/>
+              <p:prevCondLst>
+                <p:cond delay="0" evt="onPrev">
+                  <p:tgtEl>
+                    <p:sldTgt/>
+                  </p:tgtEl>
+                </p:cond>
+              </p:prevCondLst>
+              <p:nextCondLst>
+                <p:cond delay="0" evt="onNext">
+                  <p:tgtEl>
+                    <p:sldTgt/>
+                  </p:tgtEl>
+                </p:cond>
+              </p:nextCondLst>
+            </p:seq>
+          </p:childTnLst>
+        </p:cTn>
+      </p:par>
+    </p:tnLst>
+  </p:timing>
+</p:sld>
+</file>
+
+<file path=ppt/slides/slide9.xml><?xml version="1.0" encoding="utf-8"?>
+<p:sld xmlns:a="http://schemas.openxmlformats.org/drawingml/2006/main" xmlns:p="http://schemas.openxmlformats.org/presentationml/2006/main" xmlns:r="http://schemas.openxmlformats.org/officeDocument/2006/relationships">
+  <p:cSld>
+    <p:spTree>
+      <p:nvGrpSpPr>
+        <p:cNvPr id="1" name=""/>
+        <p:cNvGrpSpPr/>
+        <p:nvPr/>
+      </p:nvGrpSpPr>
+      <p:grpSpPr>
+        <a:xfrm>
+          <a:off x="0" y="0"/>
+          <a:ext cx="0" cy="0"/>
+          <a:chOff x="0" y="0"/>
+          <a:chExt cx="0" cy="0"/>
+        </a:xfrm>
+      </p:grpSpPr>
+      <p:sp>
+        <p:nvSpPr>
+          <p:cNvPr id="53" name="CustomShape 1"/>
+          <p:cNvSpPr/>
+          <p:nvPr/>
+        </p:nvSpPr>
+        <p:spPr>
+          <a:xfrm>
+            <a:off x="504000" y="301320"/>
+            <a:ext cx="9071280" cy="1261800"/>
+          </a:xfrm>
+          <a:prstGeom prst="rect">
+            <a:avLst/>
+          </a:prstGeom>
+          <a:noFill/>
+          <a:ln>
+            <a:noFill/>
+          </a:ln>
+        </p:spPr>
+        <p:style>
+          <a:lnRef idx="0"/>
+          <a:fillRef idx="0"/>
+          <a:effectRef idx="0"/>
+          <a:fontRef idx="minor"/>
+        </p:style>
+        <p:txBody>
+          <a:bodyPr lIns="0" rIns="0" tIns="0" bIns="0" anchor="ctr"/>
+          <a:p>
+            <a:r>
+              <a:rPr b="1" lang="en-AU" sz="4400" strike="noStrike">
+                <a:latin typeface="Arial"/>
+              </a:rPr>
+              <a:t>Question 4</a:t>
+            </a:r>
+            <a:endParaRPr/>
+          </a:p>
+        </p:txBody>
+      </p:sp>
+      <p:sp>
+        <p:nvSpPr>
+          <p:cNvPr id="54" name="CustomShape 2"/>
+          <p:cNvSpPr/>
+          <p:nvPr/>
+        </p:nvSpPr>
+        <p:spPr>
+          <a:xfrm>
+            <a:off x="504000" y="1500840"/>
+            <a:ext cx="9071280" cy="4920840"/>
+          </a:xfrm>
+          <a:prstGeom prst="rect">
+            <a:avLst/>
+          </a:prstGeom>
+          <a:noFill/>
+          <a:ln>
+            <a:noFill/>
+          </a:ln>
+        </p:spPr>
+        <p:style>
+          <a:lnRef idx="0"/>
+          <a:fillRef idx="0"/>
+          <a:effectRef idx="0"/>
+          <a:fontRef idx="minor"/>
+        </p:style>
+        <p:txBody>
+          <a:bodyPr lIns="0" rIns="0" tIns="0" bIns="0" anchor="ctr"/>
+          <a:p>
+            <a:r>
+              <a:rPr lang="en-AU" sz="3600" strike="noStrike">
+                <a:latin typeface="Arial"/>
+              </a:rPr>
+              <a:t>How do you get access to bigger machines?</a:t>
+            </a:r>
+            <a:endParaRPr/>
+          </a:p>
+          <a:p>
+            <a:endParaRPr/>
+          </a:p>
+          <a:p>
+            <a:pPr>
+              <a:lnSpc>
+                <a:spcPct val="100000"/>
+              </a:lnSpc>
+              <a:buFont typeface="StarSymbol"/>
+              <a:buAutoNum type="alphaUcParenR"/>
+            </a:pPr>
+            <a:r>
+              <a:rPr lang="en-AU" sz="3600" strike="noStrike">
+                <a:latin typeface="Arial"/>
+              </a:rPr>
+              <a:t> </a:t>
+            </a:r>
+            <a:r>
+              <a:rPr lang="en-AU" sz="3600" strike="noStrike">
+                <a:latin typeface="Arial"/>
+              </a:rPr>
+              <a:t>You can't: it's hopeless!</a:t>
+            </a:r>
+            <a:endParaRPr/>
+          </a:p>
+          <a:p>
+            <a:pPr>
+              <a:lnSpc>
+                <a:spcPct val="100000"/>
+              </a:lnSpc>
+              <a:buFont typeface="StarSymbol"/>
+              <a:buAutoNum type="alphaUcParenR"/>
+            </a:pPr>
+            <a:r>
+              <a:rPr lang="en-AU" sz="3600" strike="noStrike">
+                <a:latin typeface="Arial"/>
+              </a:rPr>
+              <a:t> </a:t>
+            </a:r>
+            <a:r>
+              <a:rPr lang="en-AU" sz="3600" strike="noStrike">
+                <a:latin typeface="Arial"/>
+              </a:rPr>
+              <a:t>Offer NeCTAR a load of money </a:t>
+            </a:r>
+            <a:endParaRPr/>
+          </a:p>
+          <a:p>
+            <a:pPr>
+              <a:lnSpc>
+                <a:spcPct val="100000"/>
+              </a:lnSpc>
+              <a:buFont typeface="StarSymbol"/>
+              <a:buAutoNum type="alphaUcParenR"/>
+            </a:pPr>
+            <a:r>
+              <a:rPr lang="en-AU" sz="3600" strike="noStrike">
+                <a:latin typeface="Arial"/>
+              </a:rPr>
+              <a:t> </a:t>
+            </a:r>
+            <a:r>
+              <a:rPr lang="en-AU" sz="3600" strike="noStrike">
+                <a:latin typeface="Arial"/>
+              </a:rPr>
+              <a:t>Reach for your credit card and call Dell</a:t>
+            </a:r>
+            <a:endParaRPr/>
+          </a:p>
+          <a:p>
+            <a:pPr>
+              <a:lnSpc>
+                <a:spcPct val="100000"/>
+              </a:lnSpc>
+              <a:buFont typeface="StarSymbol"/>
+              <a:buAutoNum type="alphaUcParenR"/>
+            </a:pPr>
+            <a:r>
+              <a:rPr lang="en-AU" sz="3600" strike="noStrike">
+                <a:latin typeface="Arial"/>
+              </a:rPr>
+              <a:t> </a:t>
+            </a:r>
+            <a:r>
+              <a:rPr lang="en-AU" sz="3600" strike="noStrike">
+                <a:latin typeface="Arial"/>
+              </a:rPr>
+              <a:t>Make a support call to NeCTAR</a:t>
+            </a:r>
+            <a:endParaRPr/>
+          </a:p>
+          <a:p>
+            <a:pPr>
+              <a:lnSpc>
+                <a:spcPct val="100000"/>
+              </a:lnSpc>
+              <a:buFont typeface="StarSymbol"/>
+              <a:buAutoNum type="alphaUcParenR"/>
+            </a:pPr>
+            <a:r>
+              <a:rPr lang="en-AU" sz="3600" strike="noStrike">
+                <a:latin typeface="Arial"/>
+              </a:rPr>
+              <a:t> </a:t>
+            </a:r>
+            <a:r>
+              <a:rPr lang="en-AU" sz="3600" strike="noStrike">
+                <a:latin typeface="Arial"/>
+              </a:rPr>
+              <a:t>Go to the allocation tab and complete an allocation request</a:t>
+            </a:r>
+            <a:endParaRPr/>
+          </a:p>
+          <a:p>
+            <a:pPr>
+              <a:lnSpc>
+                <a:spcPct val="100000"/>
+              </a:lnSpc>
+            </a:pPr>
+            <a:endParaRPr/>
+          </a:p>
+          <a:p>
+            <a:pPr algn="ctr">
+              <a:lnSpc>
+                <a:spcPct val="100000"/>
+              </a:lnSpc>
+            </a:pPr>
+            <a:r>
+              <a:rPr lang="en-AU" sz="3200" strike="noStrike">
+                <a:latin typeface="Arial"/>
+              </a:rPr>
+              <a:t>?</a:t>
+            </a:r>
+            <a:endParaRPr/>
+          </a:p>
+        </p:txBody>
+      </p:sp>
+    </p:spTree>
+  </p:cSld>
+  <p:timing>
+    <p:tnLst>
+      <p:par>
+        <p:cTn id="17" dur="indefinite" restart="never" nodeType="tmRoot">
+          <p:childTnLst>
+            <p:seq>
+              <p:cTn id="18" nodeType="mainSeq"/>
               <p:prevCondLst>
                 <p:cond delay="0" evt="onPrev">
                   <p:tgtEl>

</xml_diff>